<commit_message>
edited the SAD and added new diagrams
</commit_message>
<xml_diff>
--- a/Metadata/Layouts.pptx
+++ b/Metadata/Layouts.pptx
@@ -7,6 +7,7 @@
   <p:sldIdLst>
     <p:sldId id="256" r:id="rId2"/>
     <p:sldId id="257" r:id="rId3"/>
+    <p:sldId id="258" r:id="rId4"/>
   </p:sldIdLst>
   <p:sldSz cx="9144000" cy="6858000" type="screen4x3"/>
   <p:notesSz cx="6858000" cy="9144000"/>
@@ -107,7 +108,7 @@
   </p:defaultTextStyle>
   <p:extLst>
     <p:ext uri="{EFAFB233-063F-42B5-8137-9DF3F51BA10A}">
-      <p15:sldGuideLst xmlns:p15="http://schemas.microsoft.com/office/powerpoint/2012/main">
+      <p15:sldGuideLst xmlns:p15="http://schemas.microsoft.com/office/powerpoint/2012/main" xmlns="">
         <p15:guide id="1" orient="horz" pos="2160">
           <p15:clr>
             <a:srgbClr val="A4A3A4"/>
@@ -305,7 +306,8 @@
           <a:p>
             <a:fld id="{2BBE3FE4-88AD-43BF-AD0B-FB4A020EBBDA}" type="datetimeFigureOut">
               <a:rPr lang="de-DE" smtClean="0"/>
-              <a:t>05.10.2015</a:t>
+              <a:pPr/>
+              <a:t>15.11.2015</a:t>
             </a:fld>
             <a:endParaRPr lang="de-DE"/>
           </a:p>
@@ -347,7 +349,8 @@
           <a:p>
             <a:fld id="{44DFAF36-78FB-4E6A-A727-A9BFD795EEAB}" type="slidenum">
               <a:rPr lang="de-DE" smtClean="0"/>
-              <a:t>‹#›</a:t>
+              <a:pPr/>
+              <a:t>‹Nr.›</a:t>
             </a:fld>
             <a:endParaRPr lang="de-DE"/>
           </a:p>
@@ -470,7 +473,8 @@
           <a:p>
             <a:fld id="{2BBE3FE4-88AD-43BF-AD0B-FB4A020EBBDA}" type="datetimeFigureOut">
               <a:rPr lang="de-DE" smtClean="0"/>
-              <a:t>05.10.2015</a:t>
+              <a:pPr/>
+              <a:t>15.11.2015</a:t>
             </a:fld>
             <a:endParaRPr lang="de-DE"/>
           </a:p>
@@ -512,7 +516,8 @@
           <a:p>
             <a:fld id="{44DFAF36-78FB-4E6A-A727-A9BFD795EEAB}" type="slidenum">
               <a:rPr lang="de-DE" smtClean="0"/>
-              <a:t>‹#›</a:t>
+              <a:pPr/>
+              <a:t>‹Nr.›</a:t>
             </a:fld>
             <a:endParaRPr lang="de-DE"/>
           </a:p>
@@ -645,7 +650,8 @@
           <a:p>
             <a:fld id="{2BBE3FE4-88AD-43BF-AD0B-FB4A020EBBDA}" type="datetimeFigureOut">
               <a:rPr lang="de-DE" smtClean="0"/>
-              <a:t>05.10.2015</a:t>
+              <a:pPr/>
+              <a:t>15.11.2015</a:t>
             </a:fld>
             <a:endParaRPr lang="de-DE"/>
           </a:p>
@@ -687,7 +693,8 @@
           <a:p>
             <a:fld id="{44DFAF36-78FB-4E6A-A727-A9BFD795EEAB}" type="slidenum">
               <a:rPr lang="de-DE" smtClean="0"/>
-              <a:t>‹#›</a:t>
+              <a:pPr/>
+              <a:t>‹Nr.›</a:t>
             </a:fld>
             <a:endParaRPr lang="de-DE"/>
           </a:p>
@@ -810,7 +817,8 @@
           <a:p>
             <a:fld id="{2BBE3FE4-88AD-43BF-AD0B-FB4A020EBBDA}" type="datetimeFigureOut">
               <a:rPr lang="de-DE" smtClean="0"/>
-              <a:t>05.10.2015</a:t>
+              <a:pPr/>
+              <a:t>15.11.2015</a:t>
             </a:fld>
             <a:endParaRPr lang="de-DE"/>
           </a:p>
@@ -852,7 +860,8 @@
           <a:p>
             <a:fld id="{44DFAF36-78FB-4E6A-A727-A9BFD795EEAB}" type="slidenum">
               <a:rPr lang="de-DE" smtClean="0"/>
-              <a:t>‹#›</a:t>
+              <a:pPr/>
+              <a:t>‹Nr.›</a:t>
             </a:fld>
             <a:endParaRPr lang="de-DE"/>
           </a:p>
@@ -1051,7 +1060,8 @@
           <a:p>
             <a:fld id="{2BBE3FE4-88AD-43BF-AD0B-FB4A020EBBDA}" type="datetimeFigureOut">
               <a:rPr lang="de-DE" smtClean="0"/>
-              <a:t>05.10.2015</a:t>
+              <a:pPr/>
+              <a:t>15.11.2015</a:t>
             </a:fld>
             <a:endParaRPr lang="de-DE"/>
           </a:p>
@@ -1093,7 +1103,8 @@
           <a:p>
             <a:fld id="{44DFAF36-78FB-4E6A-A727-A9BFD795EEAB}" type="slidenum">
               <a:rPr lang="de-DE" smtClean="0"/>
-              <a:t>‹#›</a:t>
+              <a:pPr/>
+              <a:t>‹Nr.›</a:t>
             </a:fld>
             <a:endParaRPr lang="de-DE"/>
           </a:p>
@@ -1334,7 +1345,8 @@
           <a:p>
             <a:fld id="{2BBE3FE4-88AD-43BF-AD0B-FB4A020EBBDA}" type="datetimeFigureOut">
               <a:rPr lang="de-DE" smtClean="0"/>
-              <a:t>05.10.2015</a:t>
+              <a:pPr/>
+              <a:t>15.11.2015</a:t>
             </a:fld>
             <a:endParaRPr lang="de-DE"/>
           </a:p>
@@ -1376,7 +1388,8 @@
           <a:p>
             <a:fld id="{44DFAF36-78FB-4E6A-A727-A9BFD795EEAB}" type="slidenum">
               <a:rPr lang="de-DE" smtClean="0"/>
-              <a:t>‹#›</a:t>
+              <a:pPr/>
+              <a:t>‹Nr.›</a:t>
             </a:fld>
             <a:endParaRPr lang="de-DE"/>
           </a:p>
@@ -1751,7 +1764,8 @@
           <a:p>
             <a:fld id="{2BBE3FE4-88AD-43BF-AD0B-FB4A020EBBDA}" type="datetimeFigureOut">
               <a:rPr lang="de-DE" smtClean="0"/>
-              <a:t>05.10.2015</a:t>
+              <a:pPr/>
+              <a:t>15.11.2015</a:t>
             </a:fld>
             <a:endParaRPr lang="de-DE"/>
           </a:p>
@@ -1793,7 +1807,8 @@
           <a:p>
             <a:fld id="{44DFAF36-78FB-4E6A-A727-A9BFD795EEAB}" type="slidenum">
               <a:rPr lang="de-DE" smtClean="0"/>
-              <a:t>‹#›</a:t>
+              <a:pPr/>
+              <a:t>‹Nr.›</a:t>
             </a:fld>
             <a:endParaRPr lang="de-DE"/>
           </a:p>
@@ -1864,7 +1879,8 @@
           <a:p>
             <a:fld id="{2BBE3FE4-88AD-43BF-AD0B-FB4A020EBBDA}" type="datetimeFigureOut">
               <a:rPr lang="de-DE" smtClean="0"/>
-              <a:t>05.10.2015</a:t>
+              <a:pPr/>
+              <a:t>15.11.2015</a:t>
             </a:fld>
             <a:endParaRPr lang="de-DE"/>
           </a:p>
@@ -1906,7 +1922,8 @@
           <a:p>
             <a:fld id="{44DFAF36-78FB-4E6A-A727-A9BFD795EEAB}" type="slidenum">
               <a:rPr lang="de-DE" smtClean="0"/>
-              <a:t>‹#›</a:t>
+              <a:pPr/>
+              <a:t>‹Nr.›</a:t>
             </a:fld>
             <a:endParaRPr lang="de-DE"/>
           </a:p>
@@ -1954,7 +1971,8 @@
           <a:p>
             <a:fld id="{2BBE3FE4-88AD-43BF-AD0B-FB4A020EBBDA}" type="datetimeFigureOut">
               <a:rPr lang="de-DE" smtClean="0"/>
-              <a:t>05.10.2015</a:t>
+              <a:pPr/>
+              <a:t>15.11.2015</a:t>
             </a:fld>
             <a:endParaRPr lang="de-DE"/>
           </a:p>
@@ -1996,7 +2014,8 @@
           <a:p>
             <a:fld id="{44DFAF36-78FB-4E6A-A727-A9BFD795EEAB}" type="slidenum">
               <a:rPr lang="de-DE" smtClean="0"/>
-              <a:t>‹#›</a:t>
+              <a:pPr/>
+              <a:t>‹Nr.›</a:t>
             </a:fld>
             <a:endParaRPr lang="de-DE"/>
           </a:p>
@@ -2226,7 +2245,8 @@
           <a:p>
             <a:fld id="{2BBE3FE4-88AD-43BF-AD0B-FB4A020EBBDA}" type="datetimeFigureOut">
               <a:rPr lang="de-DE" smtClean="0"/>
-              <a:t>05.10.2015</a:t>
+              <a:pPr/>
+              <a:t>15.11.2015</a:t>
             </a:fld>
             <a:endParaRPr lang="de-DE"/>
           </a:p>
@@ -2268,7 +2288,8 @@
           <a:p>
             <a:fld id="{44DFAF36-78FB-4E6A-A727-A9BFD795EEAB}" type="slidenum">
               <a:rPr lang="de-DE" smtClean="0"/>
-              <a:t>‹#›</a:t>
+              <a:pPr/>
+              <a:t>‹Nr.›</a:t>
             </a:fld>
             <a:endParaRPr lang="de-DE"/>
           </a:p>
@@ -2474,7 +2495,8 @@
           <a:p>
             <a:fld id="{2BBE3FE4-88AD-43BF-AD0B-FB4A020EBBDA}" type="datetimeFigureOut">
               <a:rPr lang="de-DE" smtClean="0"/>
-              <a:t>05.10.2015</a:t>
+              <a:pPr/>
+              <a:t>15.11.2015</a:t>
             </a:fld>
             <a:endParaRPr lang="de-DE"/>
           </a:p>
@@ -2516,7 +2538,8 @@
           <a:p>
             <a:fld id="{44DFAF36-78FB-4E6A-A727-A9BFD795EEAB}" type="slidenum">
               <a:rPr lang="de-DE" smtClean="0"/>
-              <a:t>‹#›</a:t>
+              <a:pPr/>
+              <a:t>‹Nr.›</a:t>
             </a:fld>
             <a:endParaRPr lang="de-DE"/>
           </a:p>
@@ -2682,7 +2705,8 @@
           <a:p>
             <a:fld id="{2BBE3FE4-88AD-43BF-AD0B-FB4A020EBBDA}" type="datetimeFigureOut">
               <a:rPr lang="de-DE" smtClean="0"/>
-              <a:t>05.10.2015</a:t>
+              <a:pPr/>
+              <a:t>15.11.2015</a:t>
             </a:fld>
             <a:endParaRPr lang="de-DE"/>
           </a:p>
@@ -2760,7 +2784,8 @@
           <a:p>
             <a:fld id="{44DFAF36-78FB-4E6A-A727-A9BFD795EEAB}" type="slidenum">
               <a:rPr lang="de-DE" smtClean="0"/>
-              <a:t>‹#›</a:t>
+              <a:pPr/>
+              <a:t>‹Nr.›</a:t>
             </a:fld>
             <a:endParaRPr lang="de-DE"/>
           </a:p>
@@ -4431,7 +4456,7 @@
             </a:duotone>
             <a:extLst>
               <a:ext uri="{28A0092B-C50C-407E-A947-70E740481C1C}">
-                <a14:useLocalDpi xmlns:a14="http://schemas.microsoft.com/office/drawing/2010/main" val="0"/>
+                <a14:useLocalDpi xmlns:a14="http://schemas.microsoft.com/office/drawing/2010/main" xmlns="" val="0"/>
               </a:ext>
             </a:extLst>
           </a:blip>
@@ -4451,7 +4476,7 @@
           <a:noFill/>
           <a:extLst>
             <a:ext uri="{909E8E84-426E-40DD-AFC4-6F175D3DCCD1}">
-              <a14:hiddenFill xmlns:a14="http://schemas.microsoft.com/office/drawing/2010/main">
+              <a14:hiddenFill xmlns:a14="http://schemas.microsoft.com/office/drawing/2010/main" xmlns="">
                 <a:solidFill>
                   <a:srgbClr val="FFFFFF"/>
                 </a:solidFill>
@@ -4479,7 +4504,7 @@
             </a:duotone>
             <a:extLst>
               <a:ext uri="{28A0092B-C50C-407E-A947-70E740481C1C}">
-                <a14:useLocalDpi xmlns:a14="http://schemas.microsoft.com/office/drawing/2010/main" val="0"/>
+                <a14:useLocalDpi xmlns:a14="http://schemas.microsoft.com/office/drawing/2010/main" xmlns="" val="0"/>
               </a:ext>
             </a:extLst>
           </a:blip>
@@ -4499,7 +4524,7 @@
           <a:noFill/>
           <a:extLst>
             <a:ext uri="{909E8E84-426E-40DD-AFC4-6F175D3DCCD1}">
-              <a14:hiddenFill xmlns:a14="http://schemas.microsoft.com/office/drawing/2010/main">
+              <a14:hiddenFill xmlns:a14="http://schemas.microsoft.com/office/drawing/2010/main" xmlns="">
                 <a:solidFill>
                   <a:srgbClr val="FFFFFF"/>
                 </a:solidFill>
@@ -4527,7 +4552,7 @@
             </a:duotone>
             <a:extLst>
               <a:ext uri="{28A0092B-C50C-407E-A947-70E740481C1C}">
-                <a14:useLocalDpi xmlns:a14="http://schemas.microsoft.com/office/drawing/2010/main" val="0"/>
+                <a14:useLocalDpi xmlns:a14="http://schemas.microsoft.com/office/drawing/2010/main" xmlns="" val="0"/>
               </a:ext>
             </a:extLst>
           </a:blip>
@@ -4547,7 +4572,7 @@
           <a:noFill/>
           <a:extLst>
             <a:ext uri="{909E8E84-426E-40DD-AFC4-6F175D3DCCD1}">
-              <a14:hiddenFill xmlns:a14="http://schemas.microsoft.com/office/drawing/2010/main">
+              <a14:hiddenFill xmlns:a14="http://schemas.microsoft.com/office/drawing/2010/main" xmlns="">
                 <a:solidFill>
                   <a:srgbClr val="FFFFFF"/>
                 </a:solidFill>
@@ -4662,7 +4687,7 @@
           <p:nvPr>
             <p:extLst>
               <p:ext uri="{D42A27DB-BD31-4B8C-83A1-F6EECF244321}">
-                <p14:modId xmlns:p14="http://schemas.microsoft.com/office/powerpoint/2010/main" val="3289198072"/>
+                <p14:modId xmlns:p14="http://schemas.microsoft.com/office/powerpoint/2010/main" xmlns="" val="3289198072"/>
               </p:ext>
             </p:extLst>
           </p:nvPr>
@@ -5451,9 +5476,230 @@
     </p:spTree>
     <p:extLst>
       <p:ext uri="{BB962C8B-B14F-4D97-AF65-F5344CB8AC3E}">
-        <p14:creationId xmlns:p14="http://schemas.microsoft.com/office/powerpoint/2010/main" val="950036178"/>
+        <p14:creationId xmlns:p14="http://schemas.microsoft.com/office/powerpoint/2010/main" xmlns="" val="950036178"/>
       </p:ext>
     </p:extLst>
+  </p:cSld>
+  <p:clrMapOvr>
+    <a:masterClrMapping/>
+  </p:clrMapOvr>
+</p:sld>
+</file>
+
+<file path=ppt/slides/slide3.xml><?xml version="1.0" encoding="utf-8"?>
+<p:sld xmlns:a="http://schemas.openxmlformats.org/drawingml/2006/main" xmlns:r="http://schemas.openxmlformats.org/officeDocument/2006/relationships" xmlns:p="http://schemas.openxmlformats.org/presentationml/2006/main">
+  <p:cSld>
+    <p:spTree>
+      <p:nvGrpSpPr>
+        <p:cNvPr id="1" name=""/>
+        <p:cNvGrpSpPr/>
+        <p:nvPr/>
+      </p:nvGrpSpPr>
+      <p:grpSpPr>
+        <a:xfrm>
+          <a:off x="0" y="0"/>
+          <a:ext cx="0" cy="0"/>
+          <a:chOff x="0" y="0"/>
+          <a:chExt cx="0" cy="0"/>
+        </a:xfrm>
+      </p:grpSpPr>
+      <p:pic>
+        <p:nvPicPr>
+          <p:cNvPr id="1026" name="Picture 2" descr="D:\Sebastian\Documents\DHBW\Software Engineering\Unveiled\Unveiled-Documentation\Bilder\UML Class diagrams\UML_views.png"/>
+          <p:cNvPicPr>
+            <a:picLocks noChangeAspect="1" noChangeArrowheads="1"/>
+          </p:cNvPicPr>
+          <p:nvPr/>
+        </p:nvPicPr>
+        <p:blipFill>
+          <a:blip r:embed="rId2" cstate="print"/>
+          <a:srcRect/>
+          <a:stretch>
+            <a:fillRect/>
+          </a:stretch>
+        </p:blipFill>
+        <p:spPr bwMode="auto">
+          <a:xfrm>
+            <a:off x="-1188640" y="5589240"/>
+            <a:ext cx="10956278" cy="5832648"/>
+          </a:xfrm>
+          <a:prstGeom prst="rect">
+            <a:avLst/>
+          </a:prstGeom>
+          <a:noFill/>
+        </p:spPr>
+      </p:pic>
+      <p:pic>
+        <p:nvPicPr>
+          <p:cNvPr id="1027" name="Picture 3" descr="D:\Sebastian\Documents\DHBW\Software Engineering\Unveiled\Unveiled-Documentation\Bilder\UML Class diagrams\UML-PHP-Stack_new.png"/>
+          <p:cNvPicPr>
+            <a:picLocks noChangeAspect="1" noChangeArrowheads="1"/>
+          </p:cNvPicPr>
+          <p:nvPr/>
+        </p:nvPicPr>
+        <p:blipFill>
+          <a:blip r:embed="rId3" cstate="print"/>
+          <a:srcRect/>
+          <a:stretch>
+            <a:fillRect/>
+          </a:stretch>
+        </p:blipFill>
+        <p:spPr bwMode="auto">
+          <a:xfrm>
+            <a:off x="-1188640" y="-4203848"/>
+            <a:ext cx="10963450" cy="9793088"/>
+          </a:xfrm>
+          <a:prstGeom prst="rect">
+            <a:avLst/>
+          </a:prstGeom>
+          <a:noFill/>
+        </p:spPr>
+      </p:pic>
+      <p:sp>
+        <p:nvSpPr>
+          <p:cNvPr id="6" name="Rechteck 5"/>
+          <p:cNvSpPr/>
+          <p:nvPr/>
+        </p:nvSpPr>
+        <p:spPr>
+          <a:xfrm>
+            <a:off x="-1188640" y="-4203848"/>
+            <a:ext cx="10945216" cy="9721080"/>
+          </a:xfrm>
+          <a:prstGeom prst="rect">
+            <a:avLst/>
+          </a:prstGeom>
+          <a:noFill/>
+          <a:ln w="57150">
+            <a:solidFill>
+              <a:schemeClr val="accent6">
+                <a:lumMod val="75000"/>
+              </a:schemeClr>
+            </a:solidFill>
+          </a:ln>
+        </p:spPr>
+        <p:style>
+          <a:lnRef idx="2">
+            <a:schemeClr val="accent1">
+              <a:shade val="50000"/>
+            </a:schemeClr>
+          </a:lnRef>
+          <a:fillRef idx="1">
+            <a:schemeClr val="accent1"/>
+          </a:fillRef>
+          <a:effectRef idx="0">
+            <a:schemeClr val="accent1"/>
+          </a:effectRef>
+          <a:fontRef idx="minor">
+            <a:schemeClr val="lt1"/>
+          </a:fontRef>
+        </p:style>
+        <p:txBody>
+          <a:bodyPr rtlCol="0" anchor="ctr"/>
+          <a:lstStyle/>
+          <a:p>
+            <a:pPr algn="ctr"/>
+            <a:endParaRPr lang="de-DE"/>
+          </a:p>
+        </p:txBody>
+      </p:sp>
+      <p:sp>
+        <p:nvSpPr>
+          <p:cNvPr id="7" name="Rechteck 6"/>
+          <p:cNvSpPr/>
+          <p:nvPr/>
+        </p:nvSpPr>
+        <p:spPr>
+          <a:xfrm>
+            <a:off x="-1188640" y="5576540"/>
+            <a:ext cx="10945216" cy="4464496"/>
+          </a:xfrm>
+          <a:prstGeom prst="rect">
+            <a:avLst/>
+          </a:prstGeom>
+          <a:noFill/>
+          <a:ln w="57150">
+            <a:solidFill>
+              <a:schemeClr val="accent1">
+                <a:lumMod val="75000"/>
+              </a:schemeClr>
+            </a:solidFill>
+          </a:ln>
+        </p:spPr>
+        <p:style>
+          <a:lnRef idx="2">
+            <a:schemeClr val="accent1">
+              <a:shade val="50000"/>
+            </a:schemeClr>
+          </a:lnRef>
+          <a:fillRef idx="1">
+            <a:schemeClr val="accent1"/>
+          </a:fillRef>
+          <a:effectRef idx="0">
+            <a:schemeClr val="accent1"/>
+          </a:effectRef>
+          <a:fontRef idx="minor">
+            <a:schemeClr val="lt1"/>
+          </a:fontRef>
+        </p:style>
+        <p:txBody>
+          <a:bodyPr rtlCol="0" anchor="ctr"/>
+          <a:lstStyle/>
+          <a:p>
+            <a:pPr algn="ctr"/>
+            <a:endParaRPr lang="de-DE"/>
+          </a:p>
+        </p:txBody>
+      </p:sp>
+      <p:sp>
+        <p:nvSpPr>
+          <p:cNvPr id="8" name="Rechteck 7"/>
+          <p:cNvSpPr/>
+          <p:nvPr/>
+        </p:nvSpPr>
+        <p:spPr>
+          <a:xfrm>
+            <a:off x="-1188640" y="10110886"/>
+            <a:ext cx="10945216" cy="1332000"/>
+          </a:xfrm>
+          <a:prstGeom prst="rect">
+            <a:avLst/>
+          </a:prstGeom>
+          <a:noFill/>
+          <a:ln w="57150">
+            <a:solidFill>
+              <a:schemeClr val="accent3">
+                <a:lumMod val="75000"/>
+              </a:schemeClr>
+            </a:solidFill>
+          </a:ln>
+        </p:spPr>
+        <p:style>
+          <a:lnRef idx="2">
+            <a:schemeClr val="accent1">
+              <a:shade val="50000"/>
+            </a:schemeClr>
+          </a:lnRef>
+          <a:fillRef idx="1">
+            <a:schemeClr val="accent1"/>
+          </a:fillRef>
+          <a:effectRef idx="0">
+            <a:schemeClr val="accent1"/>
+          </a:effectRef>
+          <a:fontRef idx="minor">
+            <a:schemeClr val="lt1"/>
+          </a:fontRef>
+        </p:style>
+        <p:txBody>
+          <a:bodyPr rtlCol="0" anchor="ctr"/>
+          <a:lstStyle/>
+          <a:p>
+            <a:pPr algn="ctr"/>
+            <a:endParaRPr lang="de-DE"/>
+          </a:p>
+        </p:txBody>
+      </p:sp>
+    </p:spTree>
   </p:cSld>
   <p:clrMapOvr>
     <a:masterClrMapping/>

</xml_diff>

<commit_message>
updated SAD, class diagrams -> added DAO pattern screenshots and description
</commit_message>
<xml_diff>
--- a/Metadata/Layouts.pptx
+++ b/Metadata/Layouts.pptx
@@ -109,7 +109,7 @@
   </p:defaultTextStyle>
   <p:extLst>
     <p:ext uri="{EFAFB233-063F-42B5-8137-9DF3F51BA10A}">
-      <p15:sldGuideLst xmlns:p15="http://schemas.microsoft.com/office/powerpoint/2012/main">
+      <p15:sldGuideLst xmlns:p15="http://schemas.microsoft.com/office/powerpoint/2012/main" xmlns="">
         <p15:guide id="1" orient="horz" pos="2160">
           <p15:clr>
             <a:srgbClr val="A4A3A4"/>
@@ -308,7 +308,7 @@
             <a:fld id="{2BBE3FE4-88AD-43BF-AD0B-FB4A020EBBDA}" type="datetimeFigureOut">
               <a:rPr lang="de-DE" smtClean="0"/>
               <a:pPr/>
-              <a:t>03.06.2016</a:t>
+              <a:t>11.06.2016</a:t>
             </a:fld>
             <a:endParaRPr lang="de-DE"/>
           </a:p>
@@ -351,7 +351,7 @@
             <a:fld id="{44DFAF36-78FB-4E6A-A727-A9BFD795EEAB}" type="slidenum">
               <a:rPr lang="de-DE" smtClean="0"/>
               <a:pPr/>
-              <a:t>‹#›</a:t>
+              <a:t>‹Nr.›</a:t>
             </a:fld>
             <a:endParaRPr lang="de-DE"/>
           </a:p>
@@ -475,7 +475,7 @@
             <a:fld id="{2BBE3FE4-88AD-43BF-AD0B-FB4A020EBBDA}" type="datetimeFigureOut">
               <a:rPr lang="de-DE" smtClean="0"/>
               <a:pPr/>
-              <a:t>03.06.2016</a:t>
+              <a:t>11.06.2016</a:t>
             </a:fld>
             <a:endParaRPr lang="de-DE"/>
           </a:p>
@@ -518,7 +518,7 @@
             <a:fld id="{44DFAF36-78FB-4E6A-A727-A9BFD795EEAB}" type="slidenum">
               <a:rPr lang="de-DE" smtClean="0"/>
               <a:pPr/>
-              <a:t>‹#›</a:t>
+              <a:t>‹Nr.›</a:t>
             </a:fld>
             <a:endParaRPr lang="de-DE"/>
           </a:p>
@@ -652,7 +652,7 @@
             <a:fld id="{2BBE3FE4-88AD-43BF-AD0B-FB4A020EBBDA}" type="datetimeFigureOut">
               <a:rPr lang="de-DE" smtClean="0"/>
               <a:pPr/>
-              <a:t>03.06.2016</a:t>
+              <a:t>11.06.2016</a:t>
             </a:fld>
             <a:endParaRPr lang="de-DE"/>
           </a:p>
@@ -695,7 +695,7 @@
             <a:fld id="{44DFAF36-78FB-4E6A-A727-A9BFD795EEAB}" type="slidenum">
               <a:rPr lang="de-DE" smtClean="0"/>
               <a:pPr/>
-              <a:t>‹#›</a:t>
+              <a:t>‹Nr.›</a:t>
             </a:fld>
             <a:endParaRPr lang="de-DE"/>
           </a:p>
@@ -819,7 +819,7 @@
             <a:fld id="{2BBE3FE4-88AD-43BF-AD0B-FB4A020EBBDA}" type="datetimeFigureOut">
               <a:rPr lang="de-DE" smtClean="0"/>
               <a:pPr/>
-              <a:t>03.06.2016</a:t>
+              <a:t>11.06.2016</a:t>
             </a:fld>
             <a:endParaRPr lang="de-DE"/>
           </a:p>
@@ -862,7 +862,7 @@
             <a:fld id="{44DFAF36-78FB-4E6A-A727-A9BFD795EEAB}" type="slidenum">
               <a:rPr lang="de-DE" smtClean="0"/>
               <a:pPr/>
-              <a:t>‹#›</a:t>
+              <a:t>‹Nr.›</a:t>
             </a:fld>
             <a:endParaRPr lang="de-DE"/>
           </a:p>
@@ -1062,7 +1062,7 @@
             <a:fld id="{2BBE3FE4-88AD-43BF-AD0B-FB4A020EBBDA}" type="datetimeFigureOut">
               <a:rPr lang="de-DE" smtClean="0"/>
               <a:pPr/>
-              <a:t>03.06.2016</a:t>
+              <a:t>11.06.2016</a:t>
             </a:fld>
             <a:endParaRPr lang="de-DE"/>
           </a:p>
@@ -1105,7 +1105,7 @@
             <a:fld id="{44DFAF36-78FB-4E6A-A727-A9BFD795EEAB}" type="slidenum">
               <a:rPr lang="de-DE" smtClean="0"/>
               <a:pPr/>
-              <a:t>‹#›</a:t>
+              <a:t>‹Nr.›</a:t>
             </a:fld>
             <a:endParaRPr lang="de-DE"/>
           </a:p>
@@ -1347,7 +1347,7 @@
             <a:fld id="{2BBE3FE4-88AD-43BF-AD0B-FB4A020EBBDA}" type="datetimeFigureOut">
               <a:rPr lang="de-DE" smtClean="0"/>
               <a:pPr/>
-              <a:t>03.06.2016</a:t>
+              <a:t>11.06.2016</a:t>
             </a:fld>
             <a:endParaRPr lang="de-DE"/>
           </a:p>
@@ -1390,7 +1390,7 @@
             <a:fld id="{44DFAF36-78FB-4E6A-A727-A9BFD795EEAB}" type="slidenum">
               <a:rPr lang="de-DE" smtClean="0"/>
               <a:pPr/>
-              <a:t>‹#›</a:t>
+              <a:t>‹Nr.›</a:t>
             </a:fld>
             <a:endParaRPr lang="de-DE"/>
           </a:p>
@@ -1766,7 +1766,7 @@
             <a:fld id="{2BBE3FE4-88AD-43BF-AD0B-FB4A020EBBDA}" type="datetimeFigureOut">
               <a:rPr lang="de-DE" smtClean="0"/>
               <a:pPr/>
-              <a:t>03.06.2016</a:t>
+              <a:t>11.06.2016</a:t>
             </a:fld>
             <a:endParaRPr lang="de-DE"/>
           </a:p>
@@ -1809,7 +1809,7 @@
             <a:fld id="{44DFAF36-78FB-4E6A-A727-A9BFD795EEAB}" type="slidenum">
               <a:rPr lang="de-DE" smtClean="0"/>
               <a:pPr/>
-              <a:t>‹#›</a:t>
+              <a:t>‹Nr.›</a:t>
             </a:fld>
             <a:endParaRPr lang="de-DE"/>
           </a:p>
@@ -1881,7 +1881,7 @@
             <a:fld id="{2BBE3FE4-88AD-43BF-AD0B-FB4A020EBBDA}" type="datetimeFigureOut">
               <a:rPr lang="de-DE" smtClean="0"/>
               <a:pPr/>
-              <a:t>03.06.2016</a:t>
+              <a:t>11.06.2016</a:t>
             </a:fld>
             <a:endParaRPr lang="de-DE"/>
           </a:p>
@@ -1924,7 +1924,7 @@
             <a:fld id="{44DFAF36-78FB-4E6A-A727-A9BFD795EEAB}" type="slidenum">
               <a:rPr lang="de-DE" smtClean="0"/>
               <a:pPr/>
-              <a:t>‹#›</a:t>
+              <a:t>‹Nr.›</a:t>
             </a:fld>
             <a:endParaRPr lang="de-DE"/>
           </a:p>
@@ -1973,7 +1973,7 @@
             <a:fld id="{2BBE3FE4-88AD-43BF-AD0B-FB4A020EBBDA}" type="datetimeFigureOut">
               <a:rPr lang="de-DE" smtClean="0"/>
               <a:pPr/>
-              <a:t>03.06.2016</a:t>
+              <a:t>11.06.2016</a:t>
             </a:fld>
             <a:endParaRPr lang="de-DE"/>
           </a:p>
@@ -2016,7 +2016,7 @@
             <a:fld id="{44DFAF36-78FB-4E6A-A727-A9BFD795EEAB}" type="slidenum">
               <a:rPr lang="de-DE" smtClean="0"/>
               <a:pPr/>
-              <a:t>‹#›</a:t>
+              <a:t>‹Nr.›</a:t>
             </a:fld>
             <a:endParaRPr lang="de-DE"/>
           </a:p>
@@ -2247,7 +2247,7 @@
             <a:fld id="{2BBE3FE4-88AD-43BF-AD0B-FB4A020EBBDA}" type="datetimeFigureOut">
               <a:rPr lang="de-DE" smtClean="0"/>
               <a:pPr/>
-              <a:t>03.06.2016</a:t>
+              <a:t>11.06.2016</a:t>
             </a:fld>
             <a:endParaRPr lang="de-DE"/>
           </a:p>
@@ -2290,7 +2290,7 @@
             <a:fld id="{44DFAF36-78FB-4E6A-A727-A9BFD795EEAB}" type="slidenum">
               <a:rPr lang="de-DE" smtClean="0"/>
               <a:pPr/>
-              <a:t>‹#›</a:t>
+              <a:t>‹Nr.›</a:t>
             </a:fld>
             <a:endParaRPr lang="de-DE"/>
           </a:p>
@@ -2497,7 +2497,7 @@
             <a:fld id="{2BBE3FE4-88AD-43BF-AD0B-FB4A020EBBDA}" type="datetimeFigureOut">
               <a:rPr lang="de-DE" smtClean="0"/>
               <a:pPr/>
-              <a:t>03.06.2016</a:t>
+              <a:t>11.06.2016</a:t>
             </a:fld>
             <a:endParaRPr lang="de-DE"/>
           </a:p>
@@ -2540,7 +2540,7 @@
             <a:fld id="{44DFAF36-78FB-4E6A-A727-A9BFD795EEAB}" type="slidenum">
               <a:rPr lang="de-DE" smtClean="0"/>
               <a:pPr/>
-              <a:t>‹#›</a:t>
+              <a:t>‹Nr.›</a:t>
             </a:fld>
             <a:endParaRPr lang="de-DE"/>
           </a:p>
@@ -2707,7 +2707,7 @@
             <a:fld id="{2BBE3FE4-88AD-43BF-AD0B-FB4A020EBBDA}" type="datetimeFigureOut">
               <a:rPr lang="de-DE" smtClean="0"/>
               <a:pPr/>
-              <a:t>03.06.2016</a:t>
+              <a:t>11.06.2016</a:t>
             </a:fld>
             <a:endParaRPr lang="de-DE"/>
           </a:p>
@@ -2786,7 +2786,7 @@
             <a:fld id="{44DFAF36-78FB-4E6A-A727-A9BFD795EEAB}" type="slidenum">
               <a:rPr lang="de-DE" smtClean="0"/>
               <a:pPr/>
-              <a:t>‹#›</a:t>
+              <a:t>‹Nr.›</a:t>
             </a:fld>
             <a:endParaRPr lang="de-DE"/>
           </a:p>
@@ -4457,7 +4457,7 @@
             </a:duotone>
             <a:extLst>
               <a:ext uri="{28A0092B-C50C-407E-A947-70E740481C1C}">
-                <a14:useLocalDpi xmlns:a14="http://schemas.microsoft.com/office/drawing/2010/main" val="0"/>
+                <a14:useLocalDpi xmlns:a14="http://schemas.microsoft.com/office/drawing/2010/main" xmlns="" val="0"/>
               </a:ext>
             </a:extLst>
           </a:blip>
@@ -4477,7 +4477,7 @@
           <a:noFill/>
           <a:extLst>
             <a:ext uri="{909E8E84-426E-40DD-AFC4-6F175D3DCCD1}">
-              <a14:hiddenFill xmlns:a14="http://schemas.microsoft.com/office/drawing/2010/main">
+              <a14:hiddenFill xmlns:a14="http://schemas.microsoft.com/office/drawing/2010/main" xmlns="">
                 <a:solidFill>
                   <a:srgbClr val="FFFFFF"/>
                 </a:solidFill>
@@ -4505,7 +4505,7 @@
             </a:duotone>
             <a:extLst>
               <a:ext uri="{28A0092B-C50C-407E-A947-70E740481C1C}">
-                <a14:useLocalDpi xmlns:a14="http://schemas.microsoft.com/office/drawing/2010/main" val="0"/>
+                <a14:useLocalDpi xmlns:a14="http://schemas.microsoft.com/office/drawing/2010/main" xmlns="" val="0"/>
               </a:ext>
             </a:extLst>
           </a:blip>
@@ -4525,7 +4525,7 @@
           <a:noFill/>
           <a:extLst>
             <a:ext uri="{909E8E84-426E-40DD-AFC4-6F175D3DCCD1}">
-              <a14:hiddenFill xmlns:a14="http://schemas.microsoft.com/office/drawing/2010/main">
+              <a14:hiddenFill xmlns:a14="http://schemas.microsoft.com/office/drawing/2010/main" xmlns="">
                 <a:solidFill>
                   <a:srgbClr val="FFFFFF"/>
                 </a:solidFill>
@@ -4553,7 +4553,7 @@
             </a:duotone>
             <a:extLst>
               <a:ext uri="{28A0092B-C50C-407E-A947-70E740481C1C}">
-                <a14:useLocalDpi xmlns:a14="http://schemas.microsoft.com/office/drawing/2010/main" val="0"/>
+                <a14:useLocalDpi xmlns:a14="http://schemas.microsoft.com/office/drawing/2010/main" xmlns="" val="0"/>
               </a:ext>
             </a:extLst>
           </a:blip>
@@ -4573,7 +4573,7 @@
           <a:noFill/>
           <a:extLst>
             <a:ext uri="{909E8E84-426E-40DD-AFC4-6F175D3DCCD1}">
-              <a14:hiddenFill xmlns:a14="http://schemas.microsoft.com/office/drawing/2010/main">
+              <a14:hiddenFill xmlns:a14="http://schemas.microsoft.com/office/drawing/2010/main" xmlns="">
                 <a:solidFill>
                   <a:srgbClr val="FFFFFF"/>
                 </a:solidFill>
@@ -4688,7 +4688,7 @@
           <p:nvPr>
             <p:extLst>
               <p:ext uri="{D42A27DB-BD31-4B8C-83A1-F6EECF244321}">
-                <p14:modId xmlns:p14="http://schemas.microsoft.com/office/powerpoint/2010/main" val="3289198072"/>
+                <p14:modId xmlns:p14="http://schemas.microsoft.com/office/powerpoint/2010/main" xmlns="" val="3289198072"/>
               </p:ext>
             </p:extLst>
           </p:nvPr>
@@ -5509,7 +5509,7 @@
     </p:spTree>
     <p:extLst>
       <p:ext uri="{BB962C8B-B14F-4D97-AF65-F5344CB8AC3E}">
-        <p14:creationId xmlns:p14="http://schemas.microsoft.com/office/powerpoint/2010/main" val="950036178"/>
+        <p14:creationId xmlns:p14="http://schemas.microsoft.com/office/powerpoint/2010/main" xmlns="" val="950036178"/>
       </p:ext>
     </p:extLst>
   </p:cSld>
@@ -5536,202 +5536,219 @@
           <a:chExt cx="0" cy="0"/>
         </a:xfrm>
       </p:grpSpPr>
-      <p:pic>
-        <p:nvPicPr>
-          <p:cNvPr id="1026" name="Picture 2" descr="D:\Sebastian\Documents\DHBW\Software Engineering\Unveiled\Unveiled-Documentation\Bilder\UML Class diagrams\UML_views.png"/>
-          <p:cNvPicPr>
-            <a:picLocks noChangeAspect="1" noChangeArrowheads="1"/>
-          </p:cNvPicPr>
+      <p:grpSp>
+        <p:nvGrpSpPr>
+          <p:cNvPr id="9" name="Gruppieren 8"/>
+          <p:cNvGrpSpPr/>
           <p:nvPr/>
-        </p:nvPicPr>
-        <p:blipFill>
-          <a:blip r:embed="rId2" cstate="print"/>
-          <a:srcRect/>
-          <a:stretch>
-            <a:fillRect/>
-          </a:stretch>
-        </p:blipFill>
-        <p:spPr bwMode="auto">
-          <a:xfrm>
-            <a:off x="-1188640" y="5589240"/>
-            <a:ext cx="10956278" cy="5832648"/>
-          </a:xfrm>
-          <a:prstGeom prst="rect">
-            <a:avLst/>
-          </a:prstGeom>
-          <a:noFill/>
-        </p:spPr>
-      </p:pic>
-      <p:pic>
-        <p:nvPicPr>
-          <p:cNvPr id="1027" name="Picture 3" descr="D:\Sebastian\Documents\DHBW\Software Engineering\Unveiled\Unveiled-Documentation\Bilder\UML Class diagrams\UML-PHP-Stack_new.png"/>
-          <p:cNvPicPr>
-            <a:picLocks noChangeAspect="1" noChangeArrowheads="1"/>
-          </p:cNvPicPr>
-          <p:nvPr/>
-        </p:nvPicPr>
-        <p:blipFill>
-          <a:blip r:embed="rId3" cstate="print"/>
-          <a:srcRect/>
-          <a:stretch>
-            <a:fillRect/>
-          </a:stretch>
-        </p:blipFill>
-        <p:spPr bwMode="auto">
+        </p:nvGrpSpPr>
+        <p:grpSpPr>
           <a:xfrm>
             <a:off x="-1188640" y="-4203848"/>
-            <a:ext cx="10963450" cy="9793088"/>
+            <a:ext cx="10956278" cy="15646734"/>
+            <a:chOff x="-1188640" y="-4203848"/>
+            <a:chExt cx="10956278" cy="15646734"/>
           </a:xfrm>
-          <a:prstGeom prst="rect">
-            <a:avLst/>
-          </a:prstGeom>
-          <a:noFill/>
-        </p:spPr>
-      </p:pic>
-      <p:sp>
-        <p:nvSpPr>
-          <p:cNvPr id="6" name="Rechteck 5"/>
-          <p:cNvSpPr/>
-          <p:nvPr/>
-        </p:nvSpPr>
-        <p:spPr>
-          <a:xfrm>
-            <a:off x="-1188640" y="-4203848"/>
-            <a:ext cx="10945216" cy="9721080"/>
-          </a:xfrm>
-          <a:prstGeom prst="rect">
-            <a:avLst/>
-          </a:prstGeom>
-          <a:noFill/>
-          <a:ln w="57150">
+        </p:grpSpPr>
+        <p:sp>
+          <p:nvSpPr>
+            <p:cNvPr id="6" name="Rechteck 5"/>
+            <p:cNvSpPr/>
+            <p:nvPr/>
+          </p:nvSpPr>
+          <p:spPr>
+            <a:xfrm>
+              <a:off x="-1188640" y="-4203848"/>
+              <a:ext cx="10945216" cy="9721080"/>
+            </a:xfrm>
+            <a:prstGeom prst="rect">
+              <a:avLst/>
+            </a:prstGeom>
             <a:solidFill>
-              <a:schemeClr val="accent6">
-                <a:lumMod val="75000"/>
+              <a:schemeClr val="bg1"/>
+            </a:solidFill>
+            <a:ln w="57150">
+              <a:solidFill>
+                <a:schemeClr val="accent6">
+                  <a:lumMod val="75000"/>
+                </a:schemeClr>
+              </a:solidFill>
+            </a:ln>
+          </p:spPr>
+          <p:style>
+            <a:lnRef idx="2">
+              <a:schemeClr val="accent1">
+                <a:shade val="50000"/>
               </a:schemeClr>
-            </a:solidFill>
-          </a:ln>
-        </p:spPr>
-        <p:style>
-          <a:lnRef idx="2">
-            <a:schemeClr val="accent1">
-              <a:shade val="50000"/>
-            </a:schemeClr>
-          </a:lnRef>
-          <a:fillRef idx="1">
-            <a:schemeClr val="accent1"/>
-          </a:fillRef>
-          <a:effectRef idx="0">
-            <a:schemeClr val="accent1"/>
-          </a:effectRef>
-          <a:fontRef idx="minor">
-            <a:schemeClr val="lt1"/>
-          </a:fontRef>
-        </p:style>
-        <p:txBody>
-          <a:bodyPr rtlCol="0" anchor="ctr"/>
-          <a:lstStyle/>
-          <a:p>
-            <a:pPr algn="ctr"/>
-            <a:endParaRPr lang="de-DE"/>
-          </a:p>
-        </p:txBody>
-      </p:sp>
-      <p:sp>
-        <p:nvSpPr>
-          <p:cNvPr id="7" name="Rechteck 6"/>
-          <p:cNvSpPr/>
-          <p:nvPr/>
-        </p:nvSpPr>
-        <p:spPr>
-          <a:xfrm>
-            <a:off x="-1188640" y="5576540"/>
-            <a:ext cx="10945216" cy="4464496"/>
-          </a:xfrm>
-          <a:prstGeom prst="rect">
-            <a:avLst/>
-          </a:prstGeom>
-          <a:noFill/>
-          <a:ln w="57150">
-            <a:solidFill>
+            </a:lnRef>
+            <a:fillRef idx="1">
+              <a:schemeClr val="accent1"/>
+            </a:fillRef>
+            <a:effectRef idx="0">
+              <a:schemeClr val="accent1"/>
+            </a:effectRef>
+            <a:fontRef idx="minor">
+              <a:schemeClr val="lt1"/>
+            </a:fontRef>
+          </p:style>
+          <p:txBody>
+            <a:bodyPr rtlCol="0" anchor="ctr"/>
+            <a:lstStyle/>
+            <a:p>
+              <a:pPr algn="ctr"/>
+              <a:endParaRPr lang="de-DE"/>
+            </a:p>
+          </p:txBody>
+        </p:sp>
+        <p:pic>
+          <p:nvPicPr>
+            <p:cNvPr id="1026" name="Picture 2" descr="D:\Sebastian\Documents\DHBW\Software Engineering\Unveiled\Unveiled-Documentation\Bilder\UML Class diagrams\UML_views.png"/>
+            <p:cNvPicPr>
+              <a:picLocks noChangeAspect="1" noChangeArrowheads="1"/>
+            </p:cNvPicPr>
+            <p:nvPr/>
+          </p:nvPicPr>
+          <p:blipFill>
+            <a:blip r:embed="rId2" cstate="print"/>
+            <a:srcRect/>
+            <a:stretch>
+              <a:fillRect/>
+            </a:stretch>
+          </p:blipFill>
+          <p:spPr bwMode="auto">
+            <a:xfrm>
+              <a:off x="-1188640" y="5589240"/>
+              <a:ext cx="10956278" cy="5832648"/>
+            </a:xfrm>
+            <a:prstGeom prst="rect">
+              <a:avLst/>
+            </a:prstGeom>
+            <a:noFill/>
+          </p:spPr>
+        </p:pic>
+        <p:pic>
+          <p:nvPicPr>
+            <p:cNvPr id="1027" name="Picture 3" descr="D:\Sebastian\Documents\DHBW\Software Engineering\Unveiled\Unveiled-Documentation\Bilder\UML Class diagrams\UML-PHP-Stack_new.png"/>
+            <p:cNvPicPr>
+              <a:picLocks noChangeAspect="1" noChangeArrowheads="1"/>
+            </p:cNvPicPr>
+            <p:nvPr/>
+          </p:nvPicPr>
+          <p:blipFill>
+            <a:blip r:embed="rId3" cstate="print"/>
+            <a:srcRect t="1124" b="736"/>
+            <a:stretch>
+              <a:fillRect/>
+            </a:stretch>
+          </p:blipFill>
+          <p:spPr bwMode="auto">
+            <a:xfrm>
+              <a:off x="-976408" y="-4131840"/>
+              <a:ext cx="10538986" cy="9610972"/>
+            </a:xfrm>
+            <a:prstGeom prst="rect">
+              <a:avLst/>
+            </a:prstGeom>
+            <a:noFill/>
+          </p:spPr>
+        </p:pic>
+        <p:sp>
+          <p:nvSpPr>
+            <p:cNvPr id="7" name="Rechteck 6"/>
+            <p:cNvSpPr/>
+            <p:nvPr/>
+          </p:nvSpPr>
+          <p:spPr>
+            <a:xfrm>
+              <a:off x="-1188640" y="5576540"/>
+              <a:ext cx="10945216" cy="4464496"/>
+            </a:xfrm>
+            <a:prstGeom prst="rect">
+              <a:avLst/>
+            </a:prstGeom>
+            <a:noFill/>
+            <a:ln w="57150">
+              <a:solidFill>
+                <a:schemeClr val="accent1">
+                  <a:lumMod val="75000"/>
+                </a:schemeClr>
+              </a:solidFill>
+            </a:ln>
+          </p:spPr>
+          <p:style>
+            <a:lnRef idx="2">
               <a:schemeClr val="accent1">
-                <a:lumMod val="75000"/>
+                <a:shade val="50000"/>
               </a:schemeClr>
-            </a:solidFill>
-          </a:ln>
-        </p:spPr>
-        <p:style>
-          <a:lnRef idx="2">
-            <a:schemeClr val="accent1">
-              <a:shade val="50000"/>
-            </a:schemeClr>
-          </a:lnRef>
-          <a:fillRef idx="1">
-            <a:schemeClr val="accent1"/>
-          </a:fillRef>
-          <a:effectRef idx="0">
-            <a:schemeClr val="accent1"/>
-          </a:effectRef>
-          <a:fontRef idx="minor">
-            <a:schemeClr val="lt1"/>
-          </a:fontRef>
-        </p:style>
-        <p:txBody>
-          <a:bodyPr rtlCol="0" anchor="ctr"/>
-          <a:lstStyle/>
-          <a:p>
-            <a:pPr algn="ctr"/>
-            <a:endParaRPr lang="de-DE"/>
-          </a:p>
-        </p:txBody>
-      </p:sp>
-      <p:sp>
-        <p:nvSpPr>
-          <p:cNvPr id="8" name="Rechteck 7"/>
-          <p:cNvSpPr/>
-          <p:nvPr/>
-        </p:nvSpPr>
-        <p:spPr>
-          <a:xfrm>
-            <a:off x="-1188640" y="10110886"/>
-            <a:ext cx="10945216" cy="1332000"/>
-          </a:xfrm>
-          <a:prstGeom prst="rect">
-            <a:avLst/>
-          </a:prstGeom>
-          <a:noFill/>
-          <a:ln w="57150">
-            <a:solidFill>
-              <a:schemeClr val="accent3">
-                <a:lumMod val="75000"/>
+            </a:lnRef>
+            <a:fillRef idx="1">
+              <a:schemeClr val="accent1"/>
+            </a:fillRef>
+            <a:effectRef idx="0">
+              <a:schemeClr val="accent1"/>
+            </a:effectRef>
+            <a:fontRef idx="minor">
+              <a:schemeClr val="lt1"/>
+            </a:fontRef>
+          </p:style>
+          <p:txBody>
+            <a:bodyPr rtlCol="0" anchor="ctr"/>
+            <a:lstStyle/>
+            <a:p>
+              <a:pPr algn="ctr"/>
+              <a:endParaRPr lang="de-DE"/>
+            </a:p>
+          </p:txBody>
+        </p:sp>
+        <p:sp>
+          <p:nvSpPr>
+            <p:cNvPr id="8" name="Rechteck 7"/>
+            <p:cNvSpPr/>
+            <p:nvPr/>
+          </p:nvSpPr>
+          <p:spPr>
+            <a:xfrm>
+              <a:off x="-1188640" y="10110886"/>
+              <a:ext cx="10945216" cy="1332000"/>
+            </a:xfrm>
+            <a:prstGeom prst="rect">
+              <a:avLst/>
+            </a:prstGeom>
+            <a:noFill/>
+            <a:ln w="57150">
+              <a:solidFill>
+                <a:schemeClr val="accent3">
+                  <a:lumMod val="75000"/>
+                </a:schemeClr>
+              </a:solidFill>
+            </a:ln>
+          </p:spPr>
+          <p:style>
+            <a:lnRef idx="2">
+              <a:schemeClr val="accent1">
+                <a:shade val="50000"/>
               </a:schemeClr>
-            </a:solidFill>
-          </a:ln>
-        </p:spPr>
-        <p:style>
-          <a:lnRef idx="2">
-            <a:schemeClr val="accent1">
-              <a:shade val="50000"/>
-            </a:schemeClr>
-          </a:lnRef>
-          <a:fillRef idx="1">
-            <a:schemeClr val="accent1"/>
-          </a:fillRef>
-          <a:effectRef idx="0">
-            <a:schemeClr val="accent1"/>
-          </a:effectRef>
-          <a:fontRef idx="minor">
-            <a:schemeClr val="lt1"/>
-          </a:fontRef>
-        </p:style>
-        <p:txBody>
-          <a:bodyPr rtlCol="0" anchor="ctr"/>
-          <a:lstStyle/>
-          <a:p>
-            <a:pPr algn="ctr"/>
-            <a:endParaRPr lang="de-DE"/>
-          </a:p>
-        </p:txBody>
-      </p:sp>
+            </a:lnRef>
+            <a:fillRef idx="1">
+              <a:schemeClr val="accent1"/>
+            </a:fillRef>
+            <a:effectRef idx="0">
+              <a:schemeClr val="accent1"/>
+            </a:effectRef>
+            <a:fontRef idx="minor">
+              <a:schemeClr val="lt1"/>
+            </a:fontRef>
+          </p:style>
+          <p:txBody>
+            <a:bodyPr rtlCol="0" anchor="ctr"/>
+            <a:lstStyle/>
+            <a:p>
+              <a:pPr algn="ctr"/>
+              <a:endParaRPr lang="de-DE"/>
+            </a:p>
+          </p:txBody>
+        </p:sp>
+      </p:grpSp>
     </p:spTree>
   </p:cSld>
   <p:clrMapOvr>
@@ -5769,7 +5786,7 @@
           <a:blip r:embed="rId2" cstate="print">
             <a:extLst>
               <a:ext uri="{28A0092B-C50C-407E-A947-70E740481C1C}">
-                <a14:useLocalDpi xmlns:a14="http://schemas.microsoft.com/office/drawing/2010/main" val="0"/>
+                <a14:useLocalDpi xmlns:a14="http://schemas.microsoft.com/office/drawing/2010/main" xmlns="" val="0"/>
               </a:ext>
             </a:extLst>
           </a:blip>
@@ -5798,7 +5815,7 @@
           <a:blip r:embed="rId3" cstate="print">
             <a:extLst>
               <a:ext uri="{28A0092B-C50C-407E-A947-70E740481C1C}">
-                <a14:useLocalDpi xmlns:a14="http://schemas.microsoft.com/office/drawing/2010/main" val="0"/>
+                <a14:useLocalDpi xmlns:a14="http://schemas.microsoft.com/office/drawing/2010/main" xmlns="" val="0"/>
               </a:ext>
             </a:extLst>
           </a:blip>
@@ -5849,7 +5866,7 @@
     </p:spTree>
     <p:extLst>
       <p:ext uri="{BB962C8B-B14F-4D97-AF65-F5344CB8AC3E}">
-        <p14:creationId xmlns:p14="http://schemas.microsoft.com/office/powerpoint/2010/main" val="2687028919"/>
+        <p14:creationId xmlns:p14="http://schemas.microsoft.com/office/powerpoint/2010/main" xmlns="" val="2687028919"/>
       </p:ext>
     </p:extLst>
   </p:cSld>

</xml_diff>

<commit_message>
added build lifecycle picture
</commit_message>
<xml_diff>
--- a/Metadata/Layouts.pptx
+++ b/Metadata/Layouts.pptx
@@ -9,6 +9,7 @@
     <p:sldId id="257" r:id="rId3"/>
     <p:sldId id="258" r:id="rId4"/>
     <p:sldId id="259" r:id="rId5"/>
+    <p:sldId id="260" r:id="rId6"/>
   </p:sldIdLst>
   <p:sldSz cx="9144000" cy="6858000" type="screen4x3"/>
   <p:notesSz cx="6858000" cy="9144000"/>
@@ -109,7 +110,7 @@
   </p:defaultTextStyle>
   <p:extLst>
     <p:ext uri="{EFAFB233-063F-42B5-8137-9DF3F51BA10A}">
-      <p15:sldGuideLst xmlns:p15="http://schemas.microsoft.com/office/powerpoint/2012/main" xmlns="">
+      <p15:sldGuideLst xmlns="" xmlns:p15="http://schemas.microsoft.com/office/powerpoint/2012/main">
         <p15:guide id="1" orient="horz" pos="2160">
           <p15:clr>
             <a:srgbClr val="A4A3A4"/>
@@ -4457,7 +4458,7 @@
             </a:duotone>
             <a:extLst>
               <a:ext uri="{28A0092B-C50C-407E-A947-70E740481C1C}">
-                <a14:useLocalDpi xmlns:a14="http://schemas.microsoft.com/office/drawing/2010/main" xmlns="" val="0"/>
+                <a14:useLocalDpi xmlns="" xmlns:a14="http://schemas.microsoft.com/office/drawing/2010/main" val="0"/>
               </a:ext>
             </a:extLst>
           </a:blip>
@@ -4477,7 +4478,7 @@
           <a:noFill/>
           <a:extLst>
             <a:ext uri="{909E8E84-426E-40DD-AFC4-6F175D3DCCD1}">
-              <a14:hiddenFill xmlns:a14="http://schemas.microsoft.com/office/drawing/2010/main" xmlns="">
+              <a14:hiddenFill xmlns="" xmlns:a14="http://schemas.microsoft.com/office/drawing/2010/main">
                 <a:solidFill>
                   <a:srgbClr val="FFFFFF"/>
                 </a:solidFill>
@@ -4505,7 +4506,7 @@
             </a:duotone>
             <a:extLst>
               <a:ext uri="{28A0092B-C50C-407E-A947-70E740481C1C}">
-                <a14:useLocalDpi xmlns:a14="http://schemas.microsoft.com/office/drawing/2010/main" xmlns="" val="0"/>
+                <a14:useLocalDpi xmlns="" xmlns:a14="http://schemas.microsoft.com/office/drawing/2010/main" val="0"/>
               </a:ext>
             </a:extLst>
           </a:blip>
@@ -4525,7 +4526,7 @@
           <a:noFill/>
           <a:extLst>
             <a:ext uri="{909E8E84-426E-40DD-AFC4-6F175D3DCCD1}">
-              <a14:hiddenFill xmlns:a14="http://schemas.microsoft.com/office/drawing/2010/main" xmlns="">
+              <a14:hiddenFill xmlns="" xmlns:a14="http://schemas.microsoft.com/office/drawing/2010/main">
                 <a:solidFill>
                   <a:srgbClr val="FFFFFF"/>
                 </a:solidFill>
@@ -4553,7 +4554,7 @@
             </a:duotone>
             <a:extLst>
               <a:ext uri="{28A0092B-C50C-407E-A947-70E740481C1C}">
-                <a14:useLocalDpi xmlns:a14="http://schemas.microsoft.com/office/drawing/2010/main" xmlns="" val="0"/>
+                <a14:useLocalDpi xmlns="" xmlns:a14="http://schemas.microsoft.com/office/drawing/2010/main" val="0"/>
               </a:ext>
             </a:extLst>
           </a:blip>
@@ -4573,7 +4574,7 @@
           <a:noFill/>
           <a:extLst>
             <a:ext uri="{909E8E84-426E-40DD-AFC4-6F175D3DCCD1}">
-              <a14:hiddenFill xmlns:a14="http://schemas.microsoft.com/office/drawing/2010/main" xmlns="">
+              <a14:hiddenFill xmlns="" xmlns:a14="http://schemas.microsoft.com/office/drawing/2010/main">
                 <a:solidFill>
                   <a:srgbClr val="FFFFFF"/>
                 </a:solidFill>
@@ -4688,7 +4689,7 @@
           <p:nvPr>
             <p:extLst>
               <p:ext uri="{D42A27DB-BD31-4B8C-83A1-F6EECF244321}">
-                <p14:modId xmlns:p14="http://schemas.microsoft.com/office/powerpoint/2010/main" xmlns="" val="3289198072"/>
+                <p14:modId xmlns="" xmlns:p14="http://schemas.microsoft.com/office/powerpoint/2010/main" val="3289198072"/>
               </p:ext>
             </p:extLst>
           </p:nvPr>
@@ -5509,7 +5510,7 @@
     </p:spTree>
     <p:extLst>
       <p:ext uri="{BB962C8B-B14F-4D97-AF65-F5344CB8AC3E}">
-        <p14:creationId xmlns:p14="http://schemas.microsoft.com/office/powerpoint/2010/main" xmlns="" val="950036178"/>
+        <p14:creationId xmlns="" xmlns:p14="http://schemas.microsoft.com/office/powerpoint/2010/main" val="950036178"/>
       </p:ext>
     </p:extLst>
   </p:cSld>
@@ -5786,7 +5787,7 @@
           <a:blip r:embed="rId2" cstate="print">
             <a:extLst>
               <a:ext uri="{28A0092B-C50C-407E-A947-70E740481C1C}">
-                <a14:useLocalDpi xmlns:a14="http://schemas.microsoft.com/office/drawing/2010/main" xmlns="" val="0"/>
+                <a14:useLocalDpi xmlns="" xmlns:a14="http://schemas.microsoft.com/office/drawing/2010/main" val="0"/>
               </a:ext>
             </a:extLst>
           </a:blip>
@@ -5815,7 +5816,7 @@
           <a:blip r:embed="rId3" cstate="print">
             <a:extLst>
               <a:ext uri="{28A0092B-C50C-407E-A947-70E740481C1C}">
-                <a14:useLocalDpi xmlns:a14="http://schemas.microsoft.com/office/drawing/2010/main" xmlns="" val="0"/>
+                <a14:useLocalDpi xmlns="" xmlns:a14="http://schemas.microsoft.com/office/drawing/2010/main" val="0"/>
               </a:ext>
             </a:extLst>
           </a:blip>
@@ -5866,9 +5867,1211 @@
     </p:spTree>
     <p:extLst>
       <p:ext uri="{BB962C8B-B14F-4D97-AF65-F5344CB8AC3E}">
-        <p14:creationId xmlns:p14="http://schemas.microsoft.com/office/powerpoint/2010/main" xmlns="" val="2687028919"/>
+        <p14:creationId xmlns="" xmlns:p14="http://schemas.microsoft.com/office/powerpoint/2010/main" val="2687028919"/>
       </p:ext>
     </p:extLst>
+  </p:cSld>
+  <p:clrMapOvr>
+    <a:masterClrMapping/>
+  </p:clrMapOvr>
+</p:sld>
+</file>
+
+<file path=ppt/slides/slide5.xml><?xml version="1.0" encoding="utf-8"?>
+<p:sld xmlns:a="http://schemas.openxmlformats.org/drawingml/2006/main" xmlns:r="http://schemas.openxmlformats.org/officeDocument/2006/relationships" xmlns:p="http://schemas.openxmlformats.org/presentationml/2006/main">
+  <p:cSld>
+    <p:spTree>
+      <p:nvGrpSpPr>
+        <p:cNvPr id="1" name=""/>
+        <p:cNvGrpSpPr/>
+        <p:nvPr/>
+      </p:nvGrpSpPr>
+      <p:grpSpPr>
+        <a:xfrm>
+          <a:off x="0" y="0"/>
+          <a:ext cx="0" cy="0"/>
+          <a:chOff x="0" y="0"/>
+          <a:chExt cx="0" cy="0"/>
+        </a:xfrm>
+      </p:grpSpPr>
+      <p:pic>
+        <p:nvPicPr>
+          <p:cNvPr id="1026" name="Picture 2" descr="https://upload.wikimedia.org/wikipedia/commons/thumb/0/0b/Maven_logo.svg/512px-Maven_logo.svg.png"/>
+          <p:cNvPicPr>
+            <a:picLocks noChangeAspect="1" noChangeArrowheads="1"/>
+          </p:cNvPicPr>
+          <p:nvPr/>
+        </p:nvPicPr>
+        <p:blipFill>
+          <a:blip r:embed="rId2" cstate="print"/>
+          <a:srcRect/>
+          <a:stretch>
+            <a:fillRect/>
+          </a:stretch>
+        </p:blipFill>
+        <p:spPr bwMode="auto">
+          <a:xfrm>
+            <a:off x="3995936" y="2641132"/>
+            <a:ext cx="2187321" cy="499836"/>
+          </a:xfrm>
+          <a:prstGeom prst="rect">
+            <a:avLst/>
+          </a:prstGeom>
+          <a:noFill/>
+        </p:spPr>
+      </p:pic>
+      <p:pic>
+        <p:nvPicPr>
+          <p:cNvPr id="1028" name="Picture 4" descr="http://gradle.wpengine.netdna-cdn.com/wp-content/uploads/2015/04/DV-Travis-CI.png"/>
+          <p:cNvPicPr>
+            <a:picLocks noChangeAspect="1" noChangeArrowheads="1"/>
+          </p:cNvPicPr>
+          <p:nvPr/>
+        </p:nvPicPr>
+        <p:blipFill>
+          <a:blip r:embed="rId3" cstate="print"/>
+          <a:srcRect l="34464" t="3263" r="33296"/>
+          <a:stretch>
+            <a:fillRect/>
+          </a:stretch>
+        </p:blipFill>
+        <p:spPr bwMode="auto">
+          <a:xfrm>
+            <a:off x="2739215" y="3140132"/>
+            <a:ext cx="1093655" cy="1080956"/>
+          </a:xfrm>
+          <a:prstGeom prst="rect">
+            <a:avLst/>
+          </a:prstGeom>
+          <a:noFill/>
+        </p:spPr>
+      </p:pic>
+      <p:pic>
+        <p:nvPicPr>
+          <p:cNvPr id="1030" name="Picture 6" descr="http://cdn.liviutudor.com/wp-content/uploads/2016/02/Jacoco.png"/>
+          <p:cNvPicPr>
+            <a:picLocks noChangeAspect="1" noChangeArrowheads="1"/>
+          </p:cNvPicPr>
+          <p:nvPr/>
+        </p:nvPicPr>
+        <p:blipFill>
+          <a:blip r:embed="rId4" cstate="print"/>
+          <a:srcRect/>
+          <a:stretch>
+            <a:fillRect/>
+          </a:stretch>
+        </p:blipFill>
+        <p:spPr bwMode="auto">
+          <a:xfrm>
+            <a:off x="5004048" y="3789040"/>
+            <a:ext cx="1440160" cy="553620"/>
+          </a:xfrm>
+          <a:prstGeom prst="rect">
+            <a:avLst/>
+          </a:prstGeom>
+          <a:noFill/>
+        </p:spPr>
+      </p:pic>
+      <p:pic>
+        <p:nvPicPr>
+          <p:cNvPr id="1032" name="Picture 8" descr="https://s3.amazonaws.com/assets.coveralls.io/assets/coveralls_logo-blue_wshad.png"/>
+          <p:cNvPicPr>
+            <a:picLocks noChangeAspect="1" noChangeArrowheads="1"/>
+          </p:cNvPicPr>
+          <p:nvPr/>
+        </p:nvPicPr>
+        <p:blipFill>
+          <a:blip r:embed="rId5" cstate="print"/>
+          <a:srcRect/>
+          <a:stretch>
+            <a:fillRect/>
+          </a:stretch>
+        </p:blipFill>
+        <p:spPr bwMode="auto">
+          <a:xfrm>
+            <a:off x="7668344" y="3356992"/>
+            <a:ext cx="1800200" cy="345713"/>
+          </a:xfrm>
+          <a:prstGeom prst="rect">
+            <a:avLst/>
+          </a:prstGeom>
+          <a:noFill/>
+        </p:spPr>
+      </p:pic>
+      <p:pic>
+        <p:nvPicPr>
+          <p:cNvPr id="1038" name="Picture 14" descr="http://i0.wp.com/www.naturalborncoder.com/wp-content/uploads/2015/05/sonarqube_logo_720.png?resize=720%2C200"/>
+          <p:cNvPicPr>
+            <a:picLocks noChangeAspect="1" noChangeArrowheads="1"/>
+          </p:cNvPicPr>
+          <p:nvPr/>
+        </p:nvPicPr>
+        <p:blipFill>
+          <a:blip r:embed="rId6" cstate="print"/>
+          <a:srcRect/>
+          <a:stretch>
+            <a:fillRect/>
+          </a:stretch>
+        </p:blipFill>
+        <p:spPr bwMode="auto">
+          <a:xfrm>
+            <a:off x="7668344" y="3933056"/>
+            <a:ext cx="1944216" cy="540060"/>
+          </a:xfrm>
+          <a:prstGeom prst="rect">
+            <a:avLst/>
+          </a:prstGeom>
+          <a:noFill/>
+        </p:spPr>
+      </p:pic>
+      <p:grpSp>
+        <p:nvGrpSpPr>
+          <p:cNvPr id="73" name="Gruppieren 72"/>
+          <p:cNvGrpSpPr/>
+          <p:nvPr/>
+        </p:nvGrpSpPr>
+        <p:grpSpPr>
+          <a:xfrm>
+            <a:off x="683568" y="5445224"/>
+            <a:ext cx="2232248" cy="792088"/>
+            <a:chOff x="755576" y="4977172"/>
+            <a:chExt cx="2232248" cy="792088"/>
+          </a:xfrm>
+        </p:grpSpPr>
+        <p:pic>
+          <p:nvPicPr>
+            <p:cNvPr id="1042" name="Picture 18" descr="http://1.bp.blogspot.com/-A3S1bRVLOVk/VQ3IVXbSCPI/AAAAAAAAEIo/hChJfT5VTbw/s1600/apachetomcat7-1.gif"/>
+            <p:cNvPicPr>
+              <a:picLocks noChangeAspect="1" noChangeArrowheads="1"/>
+            </p:cNvPicPr>
+            <p:nvPr/>
+          </p:nvPicPr>
+          <p:blipFill>
+            <a:blip r:embed="rId7" cstate="print">
+              <a:clrChange>
+                <a:clrFrom>
+                  <a:srgbClr val="FFFFFF"/>
+                </a:clrFrom>
+                <a:clrTo>
+                  <a:srgbClr val="FFFFFF">
+                    <a:alpha val="0"/>
+                  </a:srgbClr>
+                </a:clrTo>
+              </a:clrChange>
+            </a:blip>
+            <a:srcRect/>
+            <a:stretch>
+              <a:fillRect/>
+            </a:stretch>
+          </p:blipFill>
+          <p:spPr bwMode="auto">
+            <a:xfrm>
+              <a:off x="755576" y="4977172"/>
+              <a:ext cx="1584176" cy="792088"/>
+            </a:xfrm>
+            <a:prstGeom prst="rect">
+              <a:avLst/>
+            </a:prstGeom>
+            <a:noFill/>
+          </p:spPr>
+        </p:pic>
+        <p:pic>
+          <p:nvPicPr>
+            <p:cNvPr id="1044" name="Picture 20" descr="http://core0.staticworld.net/images/article/2014/08/logo-ubuntu-100372440-primary.idge.png"/>
+            <p:cNvPicPr>
+              <a:picLocks noChangeAspect="1" noChangeArrowheads="1"/>
+            </p:cNvPicPr>
+            <p:nvPr/>
+          </p:nvPicPr>
+          <p:blipFill>
+            <a:blip r:embed="rId8" cstate="print"/>
+            <a:srcRect l="15250" t="5491" r="19523" b="15798"/>
+            <a:stretch>
+              <a:fillRect/>
+            </a:stretch>
+          </p:blipFill>
+          <p:spPr bwMode="auto">
+            <a:xfrm>
+              <a:off x="2267744" y="5154424"/>
+              <a:ext cx="720080" cy="578832"/>
+            </a:xfrm>
+            <a:prstGeom prst="rect">
+              <a:avLst/>
+            </a:prstGeom>
+            <a:noFill/>
+          </p:spPr>
+        </p:pic>
+      </p:grpSp>
+      <p:pic>
+        <p:nvPicPr>
+          <p:cNvPr id="1046" name="Picture 22" descr="http://astah.net/features/atlassian/jira-logo.png"/>
+          <p:cNvPicPr>
+            <a:picLocks noChangeAspect="1" noChangeArrowheads="1"/>
+          </p:cNvPicPr>
+          <p:nvPr/>
+        </p:nvPicPr>
+        <p:blipFill>
+          <a:blip r:embed="rId9" cstate="print"/>
+          <a:srcRect/>
+          <a:stretch>
+            <a:fillRect/>
+          </a:stretch>
+        </p:blipFill>
+        <p:spPr bwMode="auto">
+          <a:xfrm>
+            <a:off x="4067944" y="5510327"/>
+            <a:ext cx="1584176" cy="726985"/>
+          </a:xfrm>
+          <a:prstGeom prst="rect">
+            <a:avLst/>
+          </a:prstGeom>
+          <a:noFill/>
+        </p:spPr>
+      </p:pic>
+      <p:pic>
+        <p:nvPicPr>
+          <p:cNvPr id="1050" name="Picture 26" descr="https://assets-cdn.github.com/images/modules/logos_page/Octocat.png"/>
+          <p:cNvPicPr>
+            <a:picLocks noChangeAspect="1" noChangeArrowheads="1"/>
+          </p:cNvPicPr>
+          <p:nvPr/>
+        </p:nvPicPr>
+        <p:blipFill>
+          <a:blip r:embed="rId10" cstate="print"/>
+          <a:srcRect/>
+          <a:stretch>
+            <a:fillRect/>
+          </a:stretch>
+        </p:blipFill>
+        <p:spPr bwMode="auto">
+          <a:xfrm>
+            <a:off x="2743646" y="1556792"/>
+            <a:ext cx="1108274" cy="921253"/>
+          </a:xfrm>
+          <a:prstGeom prst="rect">
+            <a:avLst/>
+          </a:prstGeom>
+          <a:noFill/>
+        </p:spPr>
+      </p:pic>
+      <p:grpSp>
+        <p:nvGrpSpPr>
+          <p:cNvPr id="22" name="Gruppieren 21"/>
+          <p:cNvGrpSpPr>
+            <a:grpSpLocks noChangeAspect="1"/>
+          </p:cNvGrpSpPr>
+          <p:nvPr/>
+        </p:nvGrpSpPr>
+        <p:grpSpPr>
+          <a:xfrm>
+            <a:off x="2339752" y="332656"/>
+            <a:ext cx="1944216" cy="454080"/>
+            <a:chOff x="-1946659" y="2492896"/>
+            <a:chExt cx="6166277" cy="1440160"/>
+          </a:xfrm>
+        </p:grpSpPr>
+        <p:pic>
+          <p:nvPicPr>
+            <p:cNvPr id="1054" name="Picture 30" descr="https://eclipse.org/artwork/images/v2/logo-800x188.png"/>
+            <p:cNvPicPr>
+              <a:picLocks noChangeAspect="1" noChangeArrowheads="1"/>
+            </p:cNvPicPr>
+            <p:nvPr/>
+          </p:nvPicPr>
+          <p:blipFill>
+            <a:blip r:embed="rId11" cstate="print"/>
+            <a:srcRect/>
+            <a:stretch>
+              <a:fillRect/>
+            </a:stretch>
+          </p:blipFill>
+          <p:spPr bwMode="auto">
+            <a:xfrm>
+              <a:off x="-1908720" y="2492896"/>
+              <a:ext cx="6128338" cy="1440160"/>
+            </a:xfrm>
+            <a:prstGeom prst="rect">
+              <a:avLst/>
+            </a:prstGeom>
+            <a:noFill/>
+          </p:spPr>
+        </p:pic>
+        <p:pic>
+          <p:nvPicPr>
+            <p:cNvPr id="1056" name="Picture 32" descr="https://wiki.eclipse.org/images/thumb/2/2d/EGit-logo-proposal-2.png/128px-EGit-logo-proposal-2.png"/>
+            <p:cNvPicPr>
+              <a:picLocks noChangeAspect="1" noChangeArrowheads="1"/>
+            </p:cNvPicPr>
+            <p:nvPr/>
+          </p:nvPicPr>
+          <p:blipFill>
+            <a:blip r:embed="rId12" cstate="print"/>
+            <a:srcRect/>
+            <a:stretch>
+              <a:fillRect/>
+            </a:stretch>
+          </p:blipFill>
+          <p:spPr bwMode="auto">
+            <a:xfrm>
+              <a:off x="-1946659" y="2492896"/>
+              <a:ext cx="1521532" cy="1440000"/>
+            </a:xfrm>
+            <a:prstGeom prst="rect">
+              <a:avLst/>
+            </a:prstGeom>
+            <a:noFill/>
+          </p:spPr>
+        </p:pic>
+      </p:grpSp>
+      <p:pic>
+        <p:nvPicPr>
+          <p:cNvPr id="1059" name="Picture 35" descr="https://p3.zdassets.com/hc/settings_assets/960438/200158055/j2MxqjmX2ar8LeC06jBR8g-S_B_Big.png"/>
+          <p:cNvPicPr>
+            <a:picLocks noChangeAspect="1" noChangeArrowheads="1"/>
+          </p:cNvPicPr>
+          <p:nvPr/>
+        </p:nvPicPr>
+        <p:blipFill>
+          <a:blip r:embed="rId13" cstate="print"/>
+          <a:srcRect/>
+          <a:stretch>
+            <a:fillRect/>
+          </a:stretch>
+        </p:blipFill>
+        <p:spPr bwMode="auto">
+          <a:xfrm>
+            <a:off x="7596336" y="1556792"/>
+            <a:ext cx="936104" cy="936104"/>
+          </a:xfrm>
+          <a:prstGeom prst="rect">
+            <a:avLst/>
+          </a:prstGeom>
+          <a:noFill/>
+        </p:spPr>
+      </p:pic>
+      <p:pic>
+        <p:nvPicPr>
+          <p:cNvPr id="1063" name="Picture 39" descr="http://interiordesign.fsu.edu/wp-content/uploads/2013/12/programmer.png"/>
+          <p:cNvPicPr>
+            <a:picLocks noChangeAspect="1" noChangeArrowheads="1"/>
+          </p:cNvPicPr>
+          <p:nvPr/>
+        </p:nvPicPr>
+        <p:blipFill>
+          <a:blip r:embed="rId14" cstate="print"/>
+          <a:srcRect/>
+          <a:stretch>
+            <a:fillRect/>
+          </a:stretch>
+        </p:blipFill>
+        <p:spPr bwMode="auto">
+          <a:xfrm>
+            <a:off x="0" y="-99392"/>
+            <a:ext cx="1383905" cy="1383905"/>
+          </a:xfrm>
+          <a:prstGeom prst="rect">
+            <a:avLst/>
+          </a:prstGeom>
+          <a:noFill/>
+        </p:spPr>
+      </p:pic>
+      <p:cxnSp>
+        <p:nvCxnSpPr>
+          <p:cNvPr id="28" name="Gerade Verbindung mit Pfeil 27"/>
+          <p:cNvCxnSpPr/>
+          <p:nvPr/>
+        </p:nvCxnSpPr>
+        <p:spPr>
+          <a:xfrm>
+            <a:off x="1403648" y="548680"/>
+            <a:ext cx="792088" cy="0"/>
+          </a:xfrm>
+          <a:prstGeom prst="straightConnector1">
+            <a:avLst/>
+          </a:prstGeom>
+          <a:ln>
+            <a:tailEnd type="arrow"/>
+          </a:ln>
+        </p:spPr>
+        <p:style>
+          <a:lnRef idx="2">
+            <a:schemeClr val="dk1"/>
+          </a:lnRef>
+          <a:fillRef idx="0">
+            <a:schemeClr val="dk1"/>
+          </a:fillRef>
+          <a:effectRef idx="1">
+            <a:schemeClr val="dk1"/>
+          </a:effectRef>
+          <a:fontRef idx="minor">
+            <a:schemeClr val="tx1"/>
+          </a:fontRef>
+        </p:style>
+      </p:cxnSp>
+      <p:cxnSp>
+        <p:nvCxnSpPr>
+          <p:cNvPr id="30" name="Gerade Verbindung mit Pfeil 29"/>
+          <p:cNvCxnSpPr/>
+          <p:nvPr/>
+        </p:nvCxnSpPr>
+        <p:spPr>
+          <a:xfrm>
+            <a:off x="3275856" y="908720"/>
+            <a:ext cx="0" cy="576064"/>
+          </a:xfrm>
+          <a:prstGeom prst="straightConnector1">
+            <a:avLst/>
+          </a:prstGeom>
+          <a:ln>
+            <a:tailEnd type="arrow"/>
+          </a:ln>
+        </p:spPr>
+        <p:style>
+          <a:lnRef idx="2">
+            <a:schemeClr val="dk1"/>
+          </a:lnRef>
+          <a:fillRef idx="0">
+            <a:schemeClr val="dk1"/>
+          </a:fillRef>
+          <a:effectRef idx="1">
+            <a:schemeClr val="dk1"/>
+          </a:effectRef>
+          <a:fontRef idx="minor">
+            <a:schemeClr val="tx1"/>
+          </a:fontRef>
+        </p:style>
+      </p:cxnSp>
+      <p:cxnSp>
+        <p:nvCxnSpPr>
+          <p:cNvPr id="33" name="Gerade Verbindung mit Pfeil 32"/>
+          <p:cNvCxnSpPr/>
+          <p:nvPr/>
+        </p:nvCxnSpPr>
+        <p:spPr>
+          <a:xfrm>
+            <a:off x="3275856" y="2564904"/>
+            <a:ext cx="0" cy="576064"/>
+          </a:xfrm>
+          <a:prstGeom prst="straightConnector1">
+            <a:avLst/>
+          </a:prstGeom>
+          <a:ln>
+            <a:tailEnd type="arrow"/>
+          </a:ln>
+        </p:spPr>
+        <p:style>
+          <a:lnRef idx="2">
+            <a:schemeClr val="dk1"/>
+          </a:lnRef>
+          <a:fillRef idx="0">
+            <a:schemeClr val="dk1"/>
+          </a:fillRef>
+          <a:effectRef idx="1">
+            <a:schemeClr val="dk1"/>
+          </a:effectRef>
+          <a:fontRef idx="minor">
+            <a:schemeClr val="tx1"/>
+          </a:fontRef>
+        </p:style>
+      </p:cxnSp>
+      <p:cxnSp>
+        <p:nvCxnSpPr>
+          <p:cNvPr id="35" name="Gerade Verbindung mit Pfeil 34"/>
+          <p:cNvCxnSpPr/>
+          <p:nvPr/>
+        </p:nvCxnSpPr>
+        <p:spPr>
+          <a:xfrm flipV="1">
+            <a:off x="3635896" y="2852936"/>
+            <a:ext cx="648072" cy="432048"/>
+          </a:xfrm>
+          <a:prstGeom prst="straightConnector1">
+            <a:avLst/>
+          </a:prstGeom>
+          <a:ln>
+            <a:tailEnd type="arrow"/>
+          </a:ln>
+        </p:spPr>
+        <p:style>
+          <a:lnRef idx="2">
+            <a:schemeClr val="dk1"/>
+          </a:lnRef>
+          <a:fillRef idx="0">
+            <a:schemeClr val="dk1"/>
+          </a:fillRef>
+          <a:effectRef idx="1">
+            <a:schemeClr val="dk1"/>
+          </a:effectRef>
+          <a:fontRef idx="minor">
+            <a:schemeClr val="tx1"/>
+          </a:fontRef>
+        </p:style>
+      </p:cxnSp>
+      <p:cxnSp>
+        <p:nvCxnSpPr>
+          <p:cNvPr id="37" name="Gerade Verbindung mit Pfeil 36"/>
+          <p:cNvCxnSpPr/>
+          <p:nvPr/>
+        </p:nvCxnSpPr>
+        <p:spPr>
+          <a:xfrm>
+            <a:off x="3923928" y="1988840"/>
+            <a:ext cx="3168352" cy="0"/>
+          </a:xfrm>
+          <a:prstGeom prst="straightConnector1">
+            <a:avLst/>
+          </a:prstGeom>
+          <a:ln>
+            <a:tailEnd type="arrow"/>
+          </a:ln>
+        </p:spPr>
+        <p:style>
+          <a:lnRef idx="2">
+            <a:schemeClr val="accent1"/>
+          </a:lnRef>
+          <a:fillRef idx="0">
+            <a:schemeClr val="accent1"/>
+          </a:fillRef>
+          <a:effectRef idx="1">
+            <a:schemeClr val="accent1"/>
+          </a:effectRef>
+          <a:fontRef idx="minor">
+            <a:schemeClr val="tx1"/>
+          </a:fontRef>
+        </p:style>
+      </p:cxnSp>
+      <p:cxnSp>
+        <p:nvCxnSpPr>
+          <p:cNvPr id="41" name="Gerade Verbindung mit Pfeil 40"/>
+          <p:cNvCxnSpPr>
+            <a:stCxn id="1030" idx="3"/>
+          </p:cNvCxnSpPr>
+          <p:nvPr/>
+        </p:nvCxnSpPr>
+        <p:spPr>
+          <a:xfrm>
+            <a:off x="6444208" y="4065850"/>
+            <a:ext cx="1152128" cy="155238"/>
+          </a:xfrm>
+          <a:prstGeom prst="straightConnector1">
+            <a:avLst/>
+          </a:prstGeom>
+          <a:ln>
+            <a:tailEnd type="arrow"/>
+          </a:ln>
+        </p:spPr>
+        <p:style>
+          <a:lnRef idx="2">
+            <a:schemeClr val="accent1"/>
+          </a:lnRef>
+          <a:fillRef idx="0">
+            <a:schemeClr val="accent1"/>
+          </a:fillRef>
+          <a:effectRef idx="1">
+            <a:schemeClr val="accent1"/>
+          </a:effectRef>
+          <a:fontRef idx="minor">
+            <a:schemeClr val="tx1"/>
+          </a:fontRef>
+        </p:style>
+      </p:cxnSp>
+      <p:cxnSp>
+        <p:nvCxnSpPr>
+          <p:cNvPr id="42" name="Gerade Verbindung mit Pfeil 41"/>
+          <p:cNvCxnSpPr>
+            <a:stCxn id="1030" idx="3"/>
+          </p:cNvCxnSpPr>
+          <p:nvPr/>
+        </p:nvCxnSpPr>
+        <p:spPr>
+          <a:xfrm flipV="1">
+            <a:off x="6444208" y="3501008"/>
+            <a:ext cx="1152128" cy="564842"/>
+          </a:xfrm>
+          <a:prstGeom prst="straightConnector1">
+            <a:avLst/>
+          </a:prstGeom>
+          <a:ln>
+            <a:tailEnd type="arrow"/>
+          </a:ln>
+        </p:spPr>
+        <p:style>
+          <a:lnRef idx="2">
+            <a:schemeClr val="accent1"/>
+          </a:lnRef>
+          <a:fillRef idx="0">
+            <a:schemeClr val="accent1"/>
+          </a:fillRef>
+          <a:effectRef idx="1">
+            <a:schemeClr val="accent1"/>
+          </a:effectRef>
+          <a:fontRef idx="minor">
+            <a:schemeClr val="tx1"/>
+          </a:fontRef>
+        </p:style>
+      </p:cxnSp>
+      <p:cxnSp>
+        <p:nvCxnSpPr>
+          <p:cNvPr id="43" name="Gerade Verbindung mit Pfeil 42"/>
+          <p:cNvCxnSpPr/>
+          <p:nvPr/>
+        </p:nvCxnSpPr>
+        <p:spPr>
+          <a:xfrm flipV="1">
+            <a:off x="5724128" y="4293096"/>
+            <a:ext cx="1872208" cy="432050"/>
+          </a:xfrm>
+          <a:prstGeom prst="straightConnector1">
+            <a:avLst/>
+          </a:prstGeom>
+          <a:ln>
+            <a:tailEnd type="arrow"/>
+          </a:ln>
+        </p:spPr>
+        <p:style>
+          <a:lnRef idx="2">
+            <a:schemeClr val="accent1"/>
+          </a:lnRef>
+          <a:fillRef idx="0">
+            <a:schemeClr val="accent1"/>
+          </a:fillRef>
+          <a:effectRef idx="1">
+            <a:schemeClr val="accent1"/>
+          </a:effectRef>
+          <a:fontRef idx="minor">
+            <a:schemeClr val="tx1"/>
+          </a:fontRef>
+        </p:style>
+      </p:cxnSp>
+      <p:pic>
+        <p:nvPicPr>
+          <p:cNvPr id="1065" name="Picture 41" descr="https://marketplace-cdn.atlassian.com/files/com.marvelution.bamboo.plugins.sonar.tasks/icons/default/76aa1675-323b-4728-b1e6-72016c78e603_high.png"/>
+          <p:cNvPicPr>
+            <a:picLocks noChangeAspect="1" noChangeArrowheads="1"/>
+          </p:cNvPicPr>
+          <p:nvPr/>
+        </p:nvPicPr>
+        <p:blipFill>
+          <a:blip r:embed="rId15" cstate="print">
+            <a:clrChange>
+              <a:clrFrom>
+                <a:srgbClr val="FFFFFF"/>
+              </a:clrFrom>
+              <a:clrTo>
+                <a:srgbClr val="FFFFFF">
+                  <a:alpha val="0"/>
+                </a:srgbClr>
+              </a:clrTo>
+            </a:clrChange>
+          </a:blip>
+          <a:srcRect/>
+          <a:stretch>
+            <a:fillRect/>
+          </a:stretch>
+        </p:blipFill>
+        <p:spPr bwMode="auto">
+          <a:xfrm>
+            <a:off x="5076056" y="4365104"/>
+            <a:ext cx="576064" cy="576064"/>
+          </a:xfrm>
+          <a:prstGeom prst="rect">
+            <a:avLst/>
+          </a:prstGeom>
+          <a:noFill/>
+        </p:spPr>
+      </p:pic>
+      <p:cxnSp>
+        <p:nvCxnSpPr>
+          <p:cNvPr id="46" name="Form 45"/>
+          <p:cNvCxnSpPr>
+            <a:endCxn id="1030" idx="1"/>
+          </p:cNvCxnSpPr>
+          <p:nvPr/>
+        </p:nvCxnSpPr>
+        <p:spPr>
+          <a:xfrm rot="16200000" flipH="1">
+            <a:off x="4361587" y="3423389"/>
+            <a:ext cx="924882" cy="360040"/>
+          </a:xfrm>
+          <a:prstGeom prst="bentConnector2">
+            <a:avLst/>
+          </a:prstGeom>
+          <a:ln>
+            <a:tailEnd type="arrow"/>
+          </a:ln>
+        </p:spPr>
+        <p:style>
+          <a:lnRef idx="2">
+            <a:schemeClr val="dk1"/>
+          </a:lnRef>
+          <a:fillRef idx="0">
+            <a:schemeClr val="dk1"/>
+          </a:fillRef>
+          <a:effectRef idx="1">
+            <a:schemeClr val="dk1"/>
+          </a:effectRef>
+          <a:fontRef idx="minor">
+            <a:schemeClr val="tx1"/>
+          </a:fontRef>
+        </p:style>
+      </p:cxnSp>
+      <p:cxnSp>
+        <p:nvCxnSpPr>
+          <p:cNvPr id="47" name="Form 46"/>
+          <p:cNvCxnSpPr>
+            <a:endCxn id="1065" idx="1"/>
+          </p:cNvCxnSpPr>
+          <p:nvPr/>
+        </p:nvCxnSpPr>
+        <p:spPr>
+          <a:xfrm rot="16200000" flipH="1">
+            <a:off x="4103948" y="3681028"/>
+            <a:ext cx="1512168" cy="432048"/>
+          </a:xfrm>
+          <a:prstGeom prst="bentConnector2">
+            <a:avLst/>
+          </a:prstGeom>
+          <a:ln>
+            <a:tailEnd type="arrow"/>
+          </a:ln>
+        </p:spPr>
+        <p:style>
+          <a:lnRef idx="2">
+            <a:schemeClr val="dk1"/>
+          </a:lnRef>
+          <a:fillRef idx="0">
+            <a:schemeClr val="dk1"/>
+          </a:fillRef>
+          <a:effectRef idx="1">
+            <a:schemeClr val="dk1"/>
+          </a:effectRef>
+          <a:fontRef idx="minor">
+            <a:schemeClr val="tx1"/>
+          </a:fontRef>
+        </p:style>
+      </p:cxnSp>
+      <p:cxnSp>
+        <p:nvCxnSpPr>
+          <p:cNvPr id="71" name="Gerade Verbindung mit Pfeil 70"/>
+          <p:cNvCxnSpPr>
+            <a:stCxn id="1028" idx="2"/>
+          </p:cNvCxnSpPr>
+          <p:nvPr/>
+        </p:nvCxnSpPr>
+        <p:spPr>
+          <a:xfrm flipH="1">
+            <a:off x="1907704" y="4221088"/>
+            <a:ext cx="1378339" cy="1152128"/>
+          </a:xfrm>
+          <a:prstGeom prst="straightConnector1">
+            <a:avLst/>
+          </a:prstGeom>
+          <a:ln>
+            <a:tailEnd type="arrow"/>
+          </a:ln>
+        </p:spPr>
+        <p:style>
+          <a:lnRef idx="2">
+            <a:schemeClr val="accent3"/>
+          </a:lnRef>
+          <a:fillRef idx="0">
+            <a:schemeClr val="accent3"/>
+          </a:fillRef>
+          <a:effectRef idx="1">
+            <a:schemeClr val="accent3"/>
+          </a:effectRef>
+          <a:fontRef idx="minor">
+            <a:schemeClr val="tx1"/>
+          </a:fontRef>
+        </p:style>
+      </p:cxnSp>
+      <p:cxnSp>
+        <p:nvCxnSpPr>
+          <p:cNvPr id="76" name="Gerade Verbindung mit Pfeil 75"/>
+          <p:cNvCxnSpPr>
+            <a:stCxn id="1028" idx="2"/>
+          </p:cNvCxnSpPr>
+          <p:nvPr/>
+        </p:nvCxnSpPr>
+        <p:spPr>
+          <a:xfrm>
+            <a:off x="3286043" y="4221088"/>
+            <a:ext cx="1285957" cy="1080120"/>
+          </a:xfrm>
+          <a:prstGeom prst="straightConnector1">
+            <a:avLst/>
+          </a:prstGeom>
+          <a:ln>
+            <a:tailEnd type="arrow"/>
+          </a:ln>
+        </p:spPr>
+        <p:style>
+          <a:lnRef idx="2">
+            <a:schemeClr val="accent2"/>
+          </a:lnRef>
+          <a:fillRef idx="0">
+            <a:schemeClr val="accent2"/>
+          </a:fillRef>
+          <a:effectRef idx="1">
+            <a:schemeClr val="accent2"/>
+          </a:effectRef>
+          <a:fontRef idx="minor">
+            <a:schemeClr val="tx1"/>
+          </a:fontRef>
+        </p:style>
+      </p:cxnSp>
+      <p:sp>
+        <p:nvSpPr>
+          <p:cNvPr id="86" name="Textfeld 85"/>
+          <p:cNvSpPr txBox="1"/>
+          <p:nvPr/>
+        </p:nvSpPr>
+        <p:spPr>
+          <a:xfrm>
+            <a:off x="5004048" y="3212976"/>
+            <a:ext cx="1080120" cy="461665"/>
+          </a:xfrm>
+          <a:prstGeom prst="rect">
+            <a:avLst/>
+          </a:prstGeom>
+          <a:noFill/>
+        </p:spPr>
+        <p:txBody>
+          <a:bodyPr wrap="square" rtlCol="0">
+            <a:spAutoFit/>
+          </a:bodyPr>
+          <a:lstStyle/>
+          <a:p>
+            <a:r>
+              <a:rPr lang="de-DE" sz="2400" b="1" dirty="0" err="1" smtClean="0">
+                <a:effectLst>
+                  <a:outerShdw blurRad="38100" dist="38100" dir="2700000" algn="tl">
+                    <a:srgbClr val="000000">
+                      <a:alpha val="43137"/>
+                    </a:srgbClr>
+                  </a:outerShdw>
+                </a:effectLst>
+              </a:rPr>
+              <a:t>Build</a:t>
+            </a:r>
+            <a:endParaRPr lang="de-DE" sz="2400" b="1" dirty="0">
+              <a:effectLst>
+                <a:outerShdw blurRad="38100" dist="38100" dir="2700000" algn="tl">
+                  <a:srgbClr val="000000">
+                    <a:alpha val="43137"/>
+                  </a:srgbClr>
+                </a:outerShdw>
+              </a:effectLst>
+            </a:endParaRPr>
+          </a:p>
+        </p:txBody>
+      </p:sp>
+      <p:cxnSp>
+        <p:nvCxnSpPr>
+          <p:cNvPr id="89" name="Form 88"/>
+          <p:cNvCxnSpPr>
+            <a:endCxn id="86" idx="1"/>
+          </p:cNvCxnSpPr>
+          <p:nvPr/>
+        </p:nvCxnSpPr>
+        <p:spPr>
+          <a:xfrm>
+            <a:off x="4644008" y="3140968"/>
+            <a:ext cx="360040" cy="302841"/>
+          </a:xfrm>
+          <a:prstGeom prst="bentConnector3">
+            <a:avLst>
+              <a:gd name="adj1" fmla="val -265"/>
+            </a:avLst>
+          </a:prstGeom>
+          <a:ln>
+            <a:tailEnd type="arrow"/>
+          </a:ln>
+        </p:spPr>
+        <p:style>
+          <a:lnRef idx="2">
+            <a:schemeClr val="dk1"/>
+          </a:lnRef>
+          <a:fillRef idx="0">
+            <a:schemeClr val="dk1"/>
+          </a:fillRef>
+          <a:effectRef idx="1">
+            <a:schemeClr val="dk1"/>
+          </a:effectRef>
+          <a:fontRef idx="minor">
+            <a:schemeClr val="tx1"/>
+          </a:fontRef>
+        </p:style>
+      </p:cxnSp>
+      <p:sp>
+        <p:nvSpPr>
+          <p:cNvPr id="95" name="Textfeld 94"/>
+          <p:cNvSpPr txBox="1"/>
+          <p:nvPr/>
+        </p:nvSpPr>
+        <p:spPr>
+          <a:xfrm>
+            <a:off x="5004048" y="1700808"/>
+            <a:ext cx="1080120" cy="307777"/>
+          </a:xfrm>
+          <a:prstGeom prst="rect">
+            <a:avLst/>
+          </a:prstGeom>
+          <a:noFill/>
+        </p:spPr>
+        <p:txBody>
+          <a:bodyPr wrap="square" rtlCol="0">
+            <a:spAutoFit/>
+          </a:bodyPr>
+          <a:lstStyle/>
+          <a:p>
+            <a:r>
+              <a:rPr lang="de-DE" sz="1400" b="1" dirty="0" err="1" smtClean="0">
+                <a:solidFill>
+                  <a:schemeClr val="tx2"/>
+                </a:solidFill>
+              </a:rPr>
+              <a:t>Metrics</a:t>
+            </a:r>
+            <a:endParaRPr lang="de-DE" sz="1400" b="1" dirty="0">
+              <a:solidFill>
+                <a:schemeClr val="tx2"/>
+              </a:solidFill>
+            </a:endParaRPr>
+          </a:p>
+        </p:txBody>
+      </p:sp>
+      <p:sp>
+        <p:nvSpPr>
+          <p:cNvPr id="96" name="Textfeld 95"/>
+          <p:cNvSpPr txBox="1"/>
+          <p:nvPr/>
+        </p:nvSpPr>
+        <p:spPr>
+          <a:xfrm>
+            <a:off x="6228184" y="4561383"/>
+            <a:ext cx="1368152" cy="307777"/>
+          </a:xfrm>
+          <a:prstGeom prst="rect">
+            <a:avLst/>
+          </a:prstGeom>
+          <a:noFill/>
+        </p:spPr>
+        <p:txBody>
+          <a:bodyPr wrap="square" rtlCol="0">
+            <a:spAutoFit/>
+          </a:bodyPr>
+          <a:lstStyle/>
+          <a:p>
+            <a:r>
+              <a:rPr lang="de-DE" sz="1400" b="1" dirty="0" smtClean="0">
+                <a:solidFill>
+                  <a:schemeClr val="tx2"/>
+                </a:solidFill>
+              </a:rPr>
+              <a:t>Code Quality</a:t>
+            </a:r>
+            <a:endParaRPr lang="de-DE" sz="1400" b="1" dirty="0">
+              <a:solidFill>
+                <a:schemeClr val="tx2"/>
+              </a:solidFill>
+            </a:endParaRPr>
+          </a:p>
+        </p:txBody>
+      </p:sp>
+      <p:sp>
+        <p:nvSpPr>
+          <p:cNvPr id="100" name="Textfeld 99"/>
+          <p:cNvSpPr txBox="1"/>
+          <p:nvPr/>
+        </p:nvSpPr>
+        <p:spPr>
+          <a:xfrm>
+            <a:off x="1403648" y="4437112"/>
+            <a:ext cx="1656184" cy="523220"/>
+          </a:xfrm>
+          <a:prstGeom prst="rect">
+            <a:avLst/>
+          </a:prstGeom>
+          <a:noFill/>
+        </p:spPr>
+        <p:txBody>
+          <a:bodyPr wrap="square" rtlCol="0">
+            <a:spAutoFit/>
+          </a:bodyPr>
+          <a:lstStyle/>
+          <a:p>
+            <a:r>
+              <a:rPr lang="de-DE" sz="1400" b="1" dirty="0" err="1" smtClean="0">
+                <a:solidFill>
+                  <a:schemeClr val="accent3"/>
+                </a:solidFill>
+              </a:rPr>
+              <a:t>Build</a:t>
+            </a:r>
+            <a:r>
+              <a:rPr lang="de-DE" sz="1400" b="1" dirty="0" smtClean="0">
+                <a:solidFill>
+                  <a:schemeClr val="accent3"/>
+                </a:solidFill>
+              </a:rPr>
+              <a:t> </a:t>
+            </a:r>
+            <a:r>
+              <a:rPr lang="de-DE" sz="1400" b="1" dirty="0" err="1" smtClean="0">
+                <a:solidFill>
+                  <a:schemeClr val="accent3"/>
+                </a:solidFill>
+              </a:rPr>
+              <a:t>Success</a:t>
+            </a:r>
+            <a:r>
+              <a:rPr lang="de-DE" sz="1400" b="1" dirty="0" smtClean="0">
+                <a:solidFill>
+                  <a:schemeClr val="accent3"/>
+                </a:solidFill>
+              </a:rPr>
+              <a:t>:</a:t>
+            </a:r>
+            <a:br>
+              <a:rPr lang="de-DE" sz="1400" b="1" dirty="0" smtClean="0">
+                <a:solidFill>
+                  <a:schemeClr val="accent3"/>
+                </a:solidFill>
+              </a:rPr>
+            </a:br>
+            <a:r>
+              <a:rPr lang="de-DE" sz="1400" b="1" dirty="0" err="1" smtClean="0">
+                <a:solidFill>
+                  <a:schemeClr val="accent3"/>
+                </a:solidFill>
+              </a:rPr>
+              <a:t>Deployment</a:t>
+            </a:r>
+            <a:endParaRPr lang="de-DE" sz="1400" b="1" dirty="0">
+              <a:solidFill>
+                <a:schemeClr val="accent3"/>
+              </a:solidFill>
+            </a:endParaRPr>
+          </a:p>
+        </p:txBody>
+      </p:sp>
+      <p:sp>
+        <p:nvSpPr>
+          <p:cNvPr id="101" name="Textfeld 100"/>
+          <p:cNvSpPr txBox="1"/>
+          <p:nvPr/>
+        </p:nvSpPr>
+        <p:spPr>
+          <a:xfrm>
+            <a:off x="2915816" y="4777988"/>
+            <a:ext cx="1656184" cy="523220"/>
+          </a:xfrm>
+          <a:prstGeom prst="rect">
+            <a:avLst/>
+          </a:prstGeom>
+          <a:noFill/>
+        </p:spPr>
+        <p:txBody>
+          <a:bodyPr wrap="square" rtlCol="0">
+            <a:spAutoFit/>
+          </a:bodyPr>
+          <a:lstStyle/>
+          <a:p>
+            <a:r>
+              <a:rPr lang="de-DE" sz="1400" b="1" dirty="0" err="1" smtClean="0">
+                <a:solidFill>
+                  <a:schemeClr val="accent2"/>
+                </a:solidFill>
+              </a:rPr>
+              <a:t>Build</a:t>
+            </a:r>
+            <a:r>
+              <a:rPr lang="de-DE" sz="1400" b="1" dirty="0" smtClean="0">
+                <a:solidFill>
+                  <a:schemeClr val="accent2"/>
+                </a:solidFill>
+              </a:rPr>
+              <a:t> </a:t>
+            </a:r>
+            <a:r>
+              <a:rPr lang="de-DE" sz="1400" b="1" dirty="0" err="1" smtClean="0">
+                <a:solidFill>
+                  <a:schemeClr val="accent2"/>
+                </a:solidFill>
+              </a:rPr>
+              <a:t>Failure</a:t>
+            </a:r>
+            <a:r>
+              <a:rPr lang="de-DE" sz="1400" b="1" dirty="0" smtClean="0">
+                <a:solidFill>
+                  <a:schemeClr val="accent2"/>
+                </a:solidFill>
+              </a:rPr>
+              <a:t>:</a:t>
+            </a:r>
+            <a:br>
+              <a:rPr lang="de-DE" sz="1400" b="1" dirty="0" smtClean="0">
+                <a:solidFill>
+                  <a:schemeClr val="accent2"/>
+                </a:solidFill>
+              </a:rPr>
+            </a:br>
+            <a:r>
+              <a:rPr lang="de-DE" sz="1400" b="1" dirty="0" smtClean="0">
+                <a:solidFill>
+                  <a:schemeClr val="accent2"/>
+                </a:solidFill>
+              </a:rPr>
+              <a:t>Ticket </a:t>
+            </a:r>
+            <a:r>
+              <a:rPr lang="de-DE" sz="1400" b="1" dirty="0" err="1" smtClean="0">
+                <a:solidFill>
+                  <a:schemeClr val="accent2"/>
+                </a:solidFill>
+              </a:rPr>
+              <a:t>Creation</a:t>
+            </a:r>
+            <a:endParaRPr lang="de-DE" sz="1400" b="1" dirty="0">
+              <a:solidFill>
+                <a:schemeClr val="accent2"/>
+              </a:solidFill>
+            </a:endParaRPr>
+          </a:p>
+        </p:txBody>
+      </p:sp>
+      <p:sp>
+        <p:nvSpPr>
+          <p:cNvPr id="102" name="Textfeld 101"/>
+          <p:cNvSpPr txBox="1"/>
+          <p:nvPr/>
+        </p:nvSpPr>
+        <p:spPr>
+          <a:xfrm>
+            <a:off x="3275856" y="980728"/>
+            <a:ext cx="1656184" cy="307777"/>
+          </a:xfrm>
+          <a:prstGeom prst="rect">
+            <a:avLst/>
+          </a:prstGeom>
+          <a:noFill/>
+        </p:spPr>
+        <p:txBody>
+          <a:bodyPr wrap="square" rtlCol="0">
+            <a:spAutoFit/>
+          </a:bodyPr>
+          <a:lstStyle/>
+          <a:p>
+            <a:r>
+              <a:rPr lang="de-DE" sz="1400" b="1" dirty="0" smtClean="0"/>
+              <a:t>Push</a:t>
+            </a:r>
+            <a:endParaRPr lang="de-DE" sz="1400" b="1" dirty="0"/>
+          </a:p>
+        </p:txBody>
+      </p:sp>
+    </p:spTree>
   </p:cSld>
   <p:clrMapOvr>
     <a:masterClrMapping/>

</xml_diff>